<commit_message>
expand intro and outro
</commit_message>
<xml_diff>
--- a/doc/sas-sdtm-simulator.pptx
+++ b/doc/sas-sdtm-simulator.pptx
@@ -5,40 +5,46 @@
     <p:sldMasterId id="2147483648" r:id="rId1"/>
   </p:sldMasterIdLst>
   <p:sldIdLst>
-    <p:sldId id="266" r:id="rId2"/>
-    <p:sldId id="267" r:id="rId3"/>
-    <p:sldId id="268" r:id="rId4"/>
-    <p:sldId id="287" r:id="rId5"/>
-    <p:sldId id="270" r:id="rId6"/>
-    <p:sldId id="258" r:id="rId7"/>
-    <p:sldId id="271" r:id="rId8"/>
-    <p:sldId id="260" r:id="rId9"/>
-    <p:sldId id="272" r:id="rId10"/>
-    <p:sldId id="261" r:id="rId11"/>
-    <p:sldId id="257" r:id="rId12"/>
-    <p:sldId id="262" r:id="rId13"/>
-    <p:sldId id="263" r:id="rId14"/>
-    <p:sldId id="273" r:id="rId15"/>
-    <p:sldId id="275" r:id="rId16"/>
-    <p:sldId id="274" r:id="rId17"/>
-    <p:sldId id="269" r:id="rId18"/>
-    <p:sldId id="280" r:id="rId19"/>
-    <p:sldId id="276" r:id="rId20"/>
-    <p:sldId id="277" r:id="rId21"/>
-    <p:sldId id="278" r:id="rId22"/>
-    <p:sldId id="281" r:id="rId23"/>
-    <p:sldId id="282" r:id="rId24"/>
-    <p:sldId id="284" r:id="rId25"/>
-    <p:sldId id="283" r:id="rId26"/>
-    <p:sldId id="285" r:id="rId27"/>
-    <p:sldId id="286" r:id="rId28"/>
-    <p:sldId id="288" r:id="rId29"/>
-    <p:sldId id="289" r:id="rId30"/>
+    <p:sldId id="292" r:id="rId2"/>
+    <p:sldId id="290" r:id="rId3"/>
+    <p:sldId id="266" r:id="rId4"/>
+    <p:sldId id="291" r:id="rId5"/>
+    <p:sldId id="267" r:id="rId6"/>
+    <p:sldId id="287" r:id="rId7"/>
+    <p:sldId id="270" r:id="rId8"/>
+    <p:sldId id="258" r:id="rId9"/>
+    <p:sldId id="271" r:id="rId10"/>
+    <p:sldId id="260" r:id="rId11"/>
+    <p:sldId id="272" r:id="rId12"/>
+    <p:sldId id="261" r:id="rId13"/>
+    <p:sldId id="257" r:id="rId14"/>
+    <p:sldId id="262" r:id="rId15"/>
+    <p:sldId id="263" r:id="rId16"/>
+    <p:sldId id="273" r:id="rId17"/>
+    <p:sldId id="275" r:id="rId18"/>
+    <p:sldId id="274" r:id="rId19"/>
+    <p:sldId id="269" r:id="rId20"/>
+    <p:sldId id="280" r:id="rId21"/>
+    <p:sldId id="276" r:id="rId22"/>
+    <p:sldId id="277" r:id="rId23"/>
+    <p:sldId id="278" r:id="rId24"/>
+    <p:sldId id="281" r:id="rId25"/>
+    <p:sldId id="282" r:id="rId26"/>
+    <p:sldId id="284" r:id="rId27"/>
+    <p:sldId id="283" r:id="rId28"/>
+    <p:sldId id="285" r:id="rId29"/>
+    <p:sldId id="286" r:id="rId30"/>
+    <p:sldId id="288" r:id="rId31"/>
+    <p:sldId id="289" r:id="rId32"/>
+    <p:sldId id="293" r:id="rId33"/>
+    <p:sldId id="294" r:id="rId34"/>
+    <p:sldId id="295" r:id="rId35"/>
+    <p:sldId id="296" r:id="rId36"/>
   </p:sldIdLst>
   <p:sldSz cx="9144000" cy="6858000" type="screen4x3"/>
   <p:notesSz cx="6858000" cy="9144000"/>
   <p:custDataLst>
-    <p:tags r:id="rId31"/>
+    <p:tags r:id="rId37"/>
   </p:custDataLst>
   <p:defaultTextStyle>
     <a:defPPr>
@@ -320,7 +326,7 @@
             <a:fld id="{1D8BD707-D9CF-40AE-B4C6-C98DA3205C09}" type="datetimeFigureOut">
               <a:rPr lang="en-US" smtClean="0"/>
               <a:pPr/>
-              <a:t>1/3/2018</a:t>
+              <a:t>1/19/2018</a:t>
             </a:fld>
             <a:endParaRPr lang="en-US"/>
           </a:p>
@@ -487,7 +493,7 @@
             <a:fld id="{1D8BD707-D9CF-40AE-B4C6-C98DA3205C09}" type="datetimeFigureOut">
               <a:rPr lang="en-US" smtClean="0"/>
               <a:pPr/>
-              <a:t>1/3/2018</a:t>
+              <a:t>1/19/2018</a:t>
             </a:fld>
             <a:endParaRPr lang="en-US"/>
           </a:p>
@@ -664,7 +670,7 @@
             <a:fld id="{1D8BD707-D9CF-40AE-B4C6-C98DA3205C09}" type="datetimeFigureOut">
               <a:rPr lang="en-US" smtClean="0"/>
               <a:pPr/>
-              <a:t>1/3/2018</a:t>
+              <a:t>1/19/2018</a:t>
             </a:fld>
             <a:endParaRPr lang="en-US"/>
           </a:p>
@@ -831,7 +837,7 @@
             <a:fld id="{1D8BD707-D9CF-40AE-B4C6-C98DA3205C09}" type="datetimeFigureOut">
               <a:rPr lang="en-US" smtClean="0"/>
               <a:pPr/>
-              <a:t>1/3/2018</a:t>
+              <a:t>1/19/2018</a:t>
             </a:fld>
             <a:endParaRPr lang="en-US"/>
           </a:p>
@@ -1074,7 +1080,7 @@
             <a:fld id="{1D8BD707-D9CF-40AE-B4C6-C98DA3205C09}" type="datetimeFigureOut">
               <a:rPr lang="en-US" smtClean="0"/>
               <a:pPr/>
-              <a:t>1/3/2018</a:t>
+              <a:t>1/19/2018</a:t>
             </a:fld>
             <a:endParaRPr lang="en-US"/>
           </a:p>
@@ -1359,7 +1365,7 @@
             <a:fld id="{1D8BD707-D9CF-40AE-B4C6-C98DA3205C09}" type="datetimeFigureOut">
               <a:rPr lang="en-US" smtClean="0"/>
               <a:pPr/>
-              <a:t>1/3/2018</a:t>
+              <a:t>1/19/2018</a:t>
             </a:fld>
             <a:endParaRPr lang="en-US"/>
           </a:p>
@@ -1778,7 +1784,7 @@
             <a:fld id="{1D8BD707-D9CF-40AE-B4C6-C98DA3205C09}" type="datetimeFigureOut">
               <a:rPr lang="en-US" smtClean="0"/>
               <a:pPr/>
-              <a:t>1/3/2018</a:t>
+              <a:t>1/19/2018</a:t>
             </a:fld>
             <a:endParaRPr lang="en-US"/>
           </a:p>
@@ -1893,7 +1899,7 @@
             <a:fld id="{1D8BD707-D9CF-40AE-B4C6-C98DA3205C09}" type="datetimeFigureOut">
               <a:rPr lang="en-US" smtClean="0"/>
               <a:pPr/>
-              <a:t>1/3/2018</a:t>
+              <a:t>1/19/2018</a:t>
             </a:fld>
             <a:endParaRPr lang="en-US"/>
           </a:p>
@@ -1985,7 +1991,7 @@
             <a:fld id="{1D8BD707-D9CF-40AE-B4C6-C98DA3205C09}" type="datetimeFigureOut">
               <a:rPr lang="en-US" smtClean="0"/>
               <a:pPr/>
-              <a:t>1/3/2018</a:t>
+              <a:t>1/19/2018</a:t>
             </a:fld>
             <a:endParaRPr lang="en-US"/>
           </a:p>
@@ -2259,7 +2265,7 @@
             <a:fld id="{1D8BD707-D9CF-40AE-B4C6-C98DA3205C09}" type="datetimeFigureOut">
               <a:rPr lang="en-US" smtClean="0"/>
               <a:pPr/>
-              <a:t>1/3/2018</a:t>
+              <a:t>1/19/2018</a:t>
             </a:fld>
             <a:endParaRPr lang="en-US"/>
           </a:p>
@@ -2509,7 +2515,7 @@
             <a:fld id="{1D8BD707-D9CF-40AE-B4C6-C98DA3205C09}" type="datetimeFigureOut">
               <a:rPr lang="en-US" smtClean="0"/>
               <a:pPr/>
-              <a:t>1/3/2018</a:t>
+              <a:t>1/19/2018</a:t>
             </a:fld>
             <a:endParaRPr lang="en-US"/>
           </a:p>
@@ -2719,7 +2725,7 @@
             <a:fld id="{1D8BD707-D9CF-40AE-B4C6-C98DA3205C09}" type="datetimeFigureOut">
               <a:rPr lang="en-US" smtClean="0"/>
               <a:pPr/>
-              <a:t>1/3/2018</a:t>
+              <a:t>1/19/2018</a:t>
             </a:fld>
             <a:endParaRPr lang="en-US"/>
           </a:p>
@@ -3092,12 +3098,12 @@
       </p:grpSpPr>
       <p:sp>
         <p:nvSpPr>
-          <p:cNvPr id="2" name="Title 1"/>
+          <p:cNvPr id="3" name="Title 2"/>
           <p:cNvSpPr>
             <a:spLocks noGrp="1"/>
           </p:cNvSpPr>
           <p:nvPr>
-            <p:ph type="title"/>
+            <p:ph type="ctrTitle"/>
           </p:nvPr>
         </p:nvSpPr>
         <p:spPr/>
@@ -3107,6 +3113,13 @@
           <a:p>
             <a:r>
               <a:rPr lang="en-US" dirty="0" smtClean="0"/>
+              <a:t>Introduction to the </a:t>
+            </a:r>
+            <a:br>
+              <a:rPr lang="en-US" dirty="0" smtClean="0"/>
+            </a:br>
+            <a:r>
+              <a:rPr lang="en-US" dirty="0" smtClean="0"/>
               <a:t>SDTM Simulator</a:t>
             </a:r>
             <a:endParaRPr lang="en-US" dirty="0"/>
@@ -3115,12 +3128,12 @@
       </p:sp>
       <p:sp>
         <p:nvSpPr>
-          <p:cNvPr id="3" name="Content Placeholder 2"/>
+          <p:cNvPr id="4" name="Subtitle 3"/>
           <p:cNvSpPr>
             <a:spLocks noGrp="1"/>
           </p:cNvSpPr>
           <p:nvPr>
-            <p:ph idx="1"/>
+            <p:ph type="subTitle" idx="1"/>
           </p:nvPr>
         </p:nvSpPr>
         <p:spPr/>
@@ -3129,36 +3142,17 @@
           <a:lstStyle/>
           <a:p>
             <a:r>
-              <a:rPr lang="en-US" dirty="0"/>
-              <a:t>You want to demonstrate software capabilities to a client whom you've never worked with before</a:t>
-            </a:r>
-          </a:p>
-          <a:p>
-            <a:r>
               <a:rPr lang="en-US" dirty="0" smtClean="0"/>
-              <a:t>You </a:t>
-            </a:r>
-            <a:r>
-              <a:rPr lang="en-US" dirty="0"/>
-              <a:t>need some SDTM data for a SUG paper and you can't use client data</a:t>
-            </a:r>
-          </a:p>
-          <a:p>
-            <a:r>
-              <a:rPr lang="en-US" dirty="0" smtClean="0"/>
-              <a:t>You've </a:t>
-            </a:r>
-            <a:r>
-              <a:rPr lang="en-US" dirty="0" smtClean="0"/>
-              <a:t>got tight timelines and can't wait for "real" SDTM datasets before you start your ADaM work</a:t>
-            </a:r>
+              <a:t>by Shane Rosanbalm</a:t>
+            </a:r>
+            <a:endParaRPr lang="en-US" dirty="0"/>
           </a:p>
         </p:txBody>
       </p:sp>
     </p:spTree>
     <p:extLst>
       <p:ext uri="{BB962C8B-B14F-4D97-AF65-F5344CB8AC3E}">
-        <p14:creationId xmlns:p14="http://schemas.microsoft.com/office/powerpoint/2010/main" val="552743407"/>
+        <p14:creationId xmlns:p14="http://schemas.microsoft.com/office/powerpoint/2010/main" val="407286629"/>
       </p:ext>
     </p:extLst>
   </p:cSld>
@@ -3202,6 +3196,589 @@
             <p:ph type="title"/>
           </p:nvPr>
         </p:nvSpPr>
+        <p:spPr>
+          <a:xfrm>
+            <a:off x="457200" y="0"/>
+            <a:ext cx="8229600" cy="1143000"/>
+          </a:xfrm>
+        </p:spPr>
+        <p:txBody>
+          <a:bodyPr/>
+          <a:lstStyle/>
+          <a:p>
+            <a:r>
+              <a:rPr lang="en-US" dirty="0" smtClean="0"/>
+              <a:t>Program Flow: DM</a:t>
+            </a:r>
+            <a:endParaRPr lang="en-US" dirty="0"/>
+          </a:p>
+        </p:txBody>
+      </p:sp>
+      <p:sp>
+        <p:nvSpPr>
+          <p:cNvPr id="3" name="Content Placeholder 2"/>
+          <p:cNvSpPr>
+            <a:spLocks noGrp="1"/>
+          </p:cNvSpPr>
+          <p:nvPr>
+            <p:ph idx="1"/>
+          </p:nvPr>
+        </p:nvSpPr>
+        <p:spPr>
+          <a:xfrm>
+            <a:off x="457200" y="1143000"/>
+            <a:ext cx="8229600" cy="5029200"/>
+          </a:xfrm>
+        </p:spPr>
+        <p:txBody>
+          <a:bodyPr>
+            <a:normAutofit/>
+          </a:bodyPr>
+          <a:lstStyle/>
+          <a:p>
+            <a:pPr marL="0" indent="0">
+              <a:lnSpc>
+                <a:spcPts val="2400"/>
+              </a:lnSpc>
+              <a:buNone/>
+            </a:pPr>
+            <a:r>
+              <a:rPr lang="en-US" sz="2200" dirty="0" smtClean="0">
+                <a:latin typeface="Courier New" panose="02070309020205020404" pitchFamily="49" charset="0"/>
+                <a:cs typeface="Courier New" panose="02070309020205020404" pitchFamily="49" charset="0"/>
+              </a:rPr>
+              <a:t>%</a:t>
+            </a:r>
+            <a:r>
+              <a:rPr lang="en-US" sz="2200" dirty="0" err="1" smtClean="0">
+                <a:latin typeface="Courier New" panose="02070309020205020404" pitchFamily="49" charset="0"/>
+                <a:cs typeface="Courier New" panose="02070309020205020404" pitchFamily="49" charset="0"/>
+              </a:rPr>
+              <a:t>dm_create</a:t>
+            </a:r>
+            <a:endParaRPr lang="en-US" sz="2200" dirty="0" smtClean="0">
+              <a:latin typeface="Courier New" panose="02070309020205020404" pitchFamily="49" charset="0"/>
+              <a:cs typeface="Courier New" panose="02070309020205020404" pitchFamily="49" charset="0"/>
+            </a:endParaRPr>
+          </a:p>
+          <a:p>
+            <a:pPr marL="0" indent="0">
+              <a:lnSpc>
+                <a:spcPts val="2400"/>
+              </a:lnSpc>
+              <a:buNone/>
+            </a:pPr>
+            <a:r>
+              <a:rPr lang="en-US" sz="2200" dirty="0" smtClean="0">
+                <a:latin typeface="Courier New" panose="02070309020205020404" pitchFamily="49" charset="0"/>
+                <a:cs typeface="Courier New" panose="02070309020205020404" pitchFamily="49" charset="0"/>
+              </a:rPr>
+              <a:t>   (…</a:t>
+            </a:r>
+            <a:endParaRPr lang="en-US" sz="2200" dirty="0">
+              <a:latin typeface="Courier New" panose="02070309020205020404" pitchFamily="49" charset="0"/>
+              <a:cs typeface="Courier New" panose="02070309020205020404" pitchFamily="49" charset="0"/>
+            </a:endParaRPr>
+          </a:p>
+          <a:p>
+            <a:pPr marL="0" indent="0">
+              <a:lnSpc>
+                <a:spcPts val="2400"/>
+              </a:lnSpc>
+              <a:buNone/>
+            </a:pPr>
+            <a:r>
+              <a:rPr lang="en-US" sz="2200" dirty="0">
+                <a:latin typeface="Courier New" panose="02070309020205020404" pitchFamily="49" charset="0"/>
+                <a:cs typeface="Courier New" panose="02070309020205020404" pitchFamily="49" charset="0"/>
+              </a:rPr>
+              <a:t>   ,</a:t>
+            </a:r>
+            <a:r>
+              <a:rPr lang="en-US" sz="2200" dirty="0" err="1" smtClean="0">
+                <a:latin typeface="Courier New" panose="02070309020205020404" pitchFamily="49" charset="0"/>
+                <a:cs typeface="Courier New" panose="02070309020205020404" pitchFamily="49" charset="0"/>
+              </a:rPr>
+              <a:t>fpfvdt</a:t>
+            </a:r>
+            <a:r>
+              <a:rPr lang="en-US" sz="2200" dirty="0" smtClean="0">
+                <a:latin typeface="Courier New" panose="02070309020205020404" pitchFamily="49" charset="0"/>
+                <a:cs typeface="Courier New" panose="02070309020205020404" pitchFamily="49" charset="0"/>
+              </a:rPr>
+              <a:t>=01oct2016</a:t>
+            </a:r>
+          </a:p>
+          <a:p>
+            <a:pPr marL="0" indent="0">
+              <a:lnSpc>
+                <a:spcPts val="2400"/>
+              </a:lnSpc>
+              <a:buNone/>
+            </a:pPr>
+            <a:r>
+              <a:rPr lang="en-US" sz="2200" dirty="0">
+                <a:latin typeface="Courier New" panose="02070309020205020404" pitchFamily="49" charset="0"/>
+                <a:cs typeface="Courier New" panose="02070309020205020404" pitchFamily="49" charset="0"/>
+              </a:rPr>
+              <a:t> </a:t>
+            </a:r>
+            <a:r>
+              <a:rPr lang="en-US" sz="2200" dirty="0" smtClean="0">
+                <a:latin typeface="Courier New" panose="02070309020205020404" pitchFamily="49" charset="0"/>
+                <a:cs typeface="Courier New" panose="02070309020205020404" pitchFamily="49" charset="0"/>
+              </a:rPr>
+              <a:t>  ,</a:t>
+            </a:r>
+            <a:r>
+              <a:rPr lang="en-US" sz="2200" dirty="0" err="1" smtClean="0">
+                <a:latin typeface="Courier New" panose="02070309020205020404" pitchFamily="49" charset="0"/>
+                <a:cs typeface="Courier New" panose="02070309020205020404" pitchFamily="49" charset="0"/>
+              </a:rPr>
+              <a:t>lpfvdt</a:t>
+            </a:r>
+            <a:r>
+              <a:rPr lang="en-US" sz="2200" dirty="0" smtClean="0">
+                <a:latin typeface="Courier New" panose="02070309020205020404" pitchFamily="49" charset="0"/>
+                <a:cs typeface="Courier New" panose="02070309020205020404" pitchFamily="49" charset="0"/>
+              </a:rPr>
+              <a:t>=01apr2017</a:t>
+            </a:r>
+            <a:endParaRPr lang="en-US" sz="2200" dirty="0">
+              <a:latin typeface="Courier New" panose="02070309020205020404" pitchFamily="49" charset="0"/>
+              <a:cs typeface="Courier New" panose="02070309020205020404" pitchFamily="49" charset="0"/>
+            </a:endParaRPr>
+          </a:p>
+          <a:p>
+            <a:pPr marL="0" indent="0">
+              <a:lnSpc>
+                <a:spcPts val="2400"/>
+              </a:lnSpc>
+              <a:buNone/>
+            </a:pPr>
+            <a:r>
+              <a:rPr lang="en-US" sz="2200" dirty="0">
+                <a:latin typeface="Courier New" panose="02070309020205020404" pitchFamily="49" charset="0"/>
+                <a:cs typeface="Courier New" panose="02070309020205020404" pitchFamily="49" charset="0"/>
+              </a:rPr>
+              <a:t>   ,</a:t>
+            </a:r>
+            <a:r>
+              <a:rPr lang="en-US" sz="2200" dirty="0" err="1" smtClean="0">
+                <a:latin typeface="Courier New" panose="02070309020205020404" pitchFamily="49" charset="0"/>
+                <a:cs typeface="Courier New" panose="02070309020205020404" pitchFamily="49" charset="0"/>
+              </a:rPr>
+              <a:t>screendur</a:t>
+            </a:r>
+            <a:r>
+              <a:rPr lang="en-US" sz="2200" dirty="0" smtClean="0">
+                <a:latin typeface="Courier New" panose="02070309020205020404" pitchFamily="49" charset="0"/>
+                <a:cs typeface="Courier New" panose="02070309020205020404" pitchFamily="49" charset="0"/>
+              </a:rPr>
+              <a:t>=3</a:t>
+            </a:r>
+          </a:p>
+          <a:p>
+            <a:pPr marL="0" indent="0">
+              <a:lnSpc>
+                <a:spcPts val="2400"/>
+              </a:lnSpc>
+              <a:buNone/>
+            </a:pPr>
+            <a:r>
+              <a:rPr lang="en-US" sz="2200" dirty="0">
+                <a:latin typeface="Courier New" panose="02070309020205020404" pitchFamily="49" charset="0"/>
+                <a:cs typeface="Courier New" panose="02070309020205020404" pitchFamily="49" charset="0"/>
+              </a:rPr>
+              <a:t> </a:t>
+            </a:r>
+            <a:r>
+              <a:rPr lang="en-US" sz="2200" dirty="0" smtClean="0">
+                <a:latin typeface="Courier New" panose="02070309020205020404" pitchFamily="49" charset="0"/>
+                <a:cs typeface="Courier New" panose="02070309020205020404" pitchFamily="49" charset="0"/>
+              </a:rPr>
+              <a:t>  ,</a:t>
+            </a:r>
+            <a:r>
+              <a:rPr lang="en-US" sz="2200" dirty="0" err="1" smtClean="0">
+                <a:latin typeface="Courier New" panose="02070309020205020404" pitchFamily="49" charset="0"/>
+                <a:cs typeface="Courier New" panose="02070309020205020404" pitchFamily="49" charset="0"/>
+              </a:rPr>
+              <a:t>treatdur</a:t>
+            </a:r>
+            <a:r>
+              <a:rPr lang="en-US" sz="2200" dirty="0" smtClean="0">
+                <a:latin typeface="Courier New" panose="02070309020205020404" pitchFamily="49" charset="0"/>
+                <a:cs typeface="Courier New" panose="02070309020205020404" pitchFamily="49" charset="0"/>
+              </a:rPr>
+              <a:t>=182</a:t>
+            </a:r>
+          </a:p>
+          <a:p>
+            <a:pPr marL="0" indent="0">
+              <a:lnSpc>
+                <a:spcPts val="2400"/>
+              </a:lnSpc>
+              <a:buNone/>
+            </a:pPr>
+            <a:r>
+              <a:rPr lang="en-US" sz="2200" dirty="0">
+                <a:latin typeface="Courier New" panose="02070309020205020404" pitchFamily="49" charset="0"/>
+                <a:cs typeface="Courier New" panose="02070309020205020404" pitchFamily="49" charset="0"/>
+              </a:rPr>
+              <a:t> </a:t>
+            </a:r>
+            <a:r>
+              <a:rPr lang="en-US" sz="2200" dirty="0" smtClean="0">
+                <a:latin typeface="Courier New" panose="02070309020205020404" pitchFamily="49" charset="0"/>
+                <a:cs typeface="Courier New" panose="02070309020205020404" pitchFamily="49" charset="0"/>
+              </a:rPr>
+              <a:t>  ,</a:t>
+            </a:r>
+            <a:r>
+              <a:rPr lang="en-US" sz="2200" dirty="0" err="1" smtClean="0">
+                <a:latin typeface="Courier New" panose="02070309020205020404" pitchFamily="49" charset="0"/>
+                <a:cs typeface="Courier New" panose="02070309020205020404" pitchFamily="49" charset="0"/>
+              </a:rPr>
+              <a:t>followupdur</a:t>
+            </a:r>
+            <a:r>
+              <a:rPr lang="en-US" sz="2200" dirty="0" smtClean="0">
+                <a:latin typeface="Courier New" panose="02070309020205020404" pitchFamily="49" charset="0"/>
+                <a:cs typeface="Courier New" panose="02070309020205020404" pitchFamily="49" charset="0"/>
+              </a:rPr>
+              <a:t>=28</a:t>
+            </a:r>
+            <a:endParaRPr lang="en-US" sz="2200" dirty="0">
+              <a:latin typeface="Courier New" panose="02070309020205020404" pitchFamily="49" charset="0"/>
+              <a:cs typeface="Courier New" panose="02070309020205020404" pitchFamily="49" charset="0"/>
+            </a:endParaRPr>
+          </a:p>
+          <a:p>
+            <a:pPr marL="0" indent="0">
+              <a:lnSpc>
+                <a:spcPts val="2400"/>
+              </a:lnSpc>
+              <a:buNone/>
+            </a:pPr>
+            <a:r>
+              <a:rPr lang="en-US" sz="2200" dirty="0">
+                <a:latin typeface="Courier New" panose="02070309020205020404" pitchFamily="49" charset="0"/>
+                <a:cs typeface="Courier New" panose="02070309020205020404" pitchFamily="49" charset="0"/>
+              </a:rPr>
+              <a:t>   ,</a:t>
+            </a:r>
+            <a:r>
+              <a:rPr lang="en-US" sz="2200" dirty="0" err="1">
+                <a:latin typeface="Courier New" panose="02070309020205020404" pitchFamily="49" charset="0"/>
+                <a:cs typeface="Courier New" panose="02070309020205020404" pitchFamily="49" charset="0"/>
+              </a:rPr>
+              <a:t>deathprob</a:t>
+            </a:r>
+            <a:r>
+              <a:rPr lang="en-US" sz="2200" dirty="0">
+                <a:latin typeface="Courier New" panose="02070309020205020404" pitchFamily="49" charset="0"/>
+                <a:cs typeface="Courier New" panose="02070309020205020404" pitchFamily="49" charset="0"/>
+              </a:rPr>
+              <a:t>=0.05</a:t>
+            </a:r>
+          </a:p>
+          <a:p>
+            <a:pPr marL="0" indent="0">
+              <a:lnSpc>
+                <a:spcPts val="2400"/>
+              </a:lnSpc>
+              <a:buNone/>
+            </a:pPr>
+            <a:r>
+              <a:rPr lang="en-US" sz="2200" dirty="0">
+                <a:latin typeface="Courier New" panose="02070309020205020404" pitchFamily="49" charset="0"/>
+                <a:cs typeface="Courier New" panose="02070309020205020404" pitchFamily="49" charset="0"/>
+              </a:rPr>
+              <a:t>   </a:t>
+            </a:r>
+            <a:r>
+              <a:rPr lang="en-US" sz="2200" dirty="0" smtClean="0">
+                <a:latin typeface="Courier New" panose="02070309020205020404" pitchFamily="49" charset="0"/>
+                <a:cs typeface="Courier New" panose="02070309020205020404" pitchFamily="49" charset="0"/>
+              </a:rPr>
+              <a:t>…</a:t>
+            </a:r>
+          </a:p>
+          <a:p>
+            <a:pPr lvl="1"/>
+            <a:r>
+              <a:rPr lang="en-US" dirty="0" smtClean="0"/>
+              <a:t>Start date, end date, date of birth, etc.</a:t>
+            </a:r>
+          </a:p>
+        </p:txBody>
+      </p:sp>
+      <p:pic>
+        <p:nvPicPr>
+          <p:cNvPr id="3075" name="Picture 3"/>
+          <p:cNvPicPr>
+            <a:picLocks noChangeAspect="1" noChangeArrowheads="1"/>
+          </p:cNvPicPr>
+          <p:nvPr/>
+        </p:nvPicPr>
+        <p:blipFill rotWithShape="1">
+          <a:blip r:embed="rId2">
+            <a:extLst>
+              <a:ext uri="{28A0092B-C50C-407E-A947-70E740481C1C}">
+                <a14:useLocalDpi xmlns:a14="http://schemas.microsoft.com/office/drawing/2010/main" val="0"/>
+              </a:ext>
+            </a:extLst>
+          </a:blip>
+          <a:srcRect b="46771"/>
+          <a:stretch/>
+        </p:blipFill>
+        <p:spPr bwMode="auto">
+          <a:xfrm>
+            <a:off x="1488996" y="5088581"/>
+            <a:ext cx="6166009" cy="1693219"/>
+          </a:xfrm>
+          <a:prstGeom prst="rect">
+            <a:avLst/>
+          </a:prstGeom>
+          <a:noFill/>
+          <a:ln w="9525">
+            <a:solidFill>
+              <a:schemeClr val="tx1"/>
+            </a:solidFill>
+            <a:miter lim="800000"/>
+            <a:headEnd/>
+            <a:tailEnd/>
+          </a:ln>
+          <a:extLst>
+            <a:ext uri="{909E8E84-426E-40DD-AFC4-6F175D3DCCD1}">
+              <a14:hiddenFill xmlns:a14="http://schemas.microsoft.com/office/drawing/2010/main">
+                <a:solidFill>
+                  <a:schemeClr val="accent1"/>
+                </a:solidFill>
+              </a14:hiddenFill>
+            </a:ext>
+          </a:extLst>
+        </p:spPr>
+      </p:pic>
+    </p:spTree>
+    <p:extLst>
+      <p:ext uri="{BB962C8B-B14F-4D97-AF65-F5344CB8AC3E}">
+        <p14:creationId xmlns:p14="http://schemas.microsoft.com/office/powerpoint/2010/main" val="2428527846"/>
+      </p:ext>
+    </p:extLst>
+  </p:cSld>
+  <p:clrMapOvr>
+    <a:masterClrMapping/>
+  </p:clrMapOvr>
+  <p:timing>
+    <p:tnLst>
+      <p:par>
+        <p:cTn id="1" dur="indefinite" restart="never" nodeType="tmRoot"/>
+      </p:par>
+    </p:tnLst>
+  </p:timing>
+</p:sld>
+</file>
+
+<file path=ppt/slides/slide11.xml><?xml version="1.0" encoding="utf-8"?>
+<p:sld xmlns:a="http://schemas.openxmlformats.org/drawingml/2006/main" xmlns:r="http://schemas.openxmlformats.org/officeDocument/2006/relationships" xmlns:p="http://schemas.openxmlformats.org/presentationml/2006/main">
+  <p:cSld>
+    <p:spTree>
+      <p:nvGrpSpPr>
+        <p:cNvPr id="1" name=""/>
+        <p:cNvGrpSpPr/>
+        <p:nvPr/>
+      </p:nvGrpSpPr>
+      <p:grpSpPr>
+        <a:xfrm>
+          <a:off x="0" y="0"/>
+          <a:ext cx="0" cy="0"/>
+          <a:chOff x="0" y="0"/>
+          <a:chExt cx="0" cy="0"/>
+        </a:xfrm>
+      </p:grpSpPr>
+      <p:sp>
+        <p:nvSpPr>
+          <p:cNvPr id="2" name="Title 1"/>
+          <p:cNvSpPr>
+            <a:spLocks noGrp="1"/>
+          </p:cNvSpPr>
+          <p:nvPr>
+            <p:ph type="title"/>
+          </p:nvPr>
+        </p:nvSpPr>
+        <p:spPr>
+          <a:xfrm>
+            <a:off x="457200" y="152400"/>
+            <a:ext cx="8229600" cy="1143000"/>
+          </a:xfrm>
+        </p:spPr>
+        <p:txBody>
+          <a:bodyPr/>
+          <a:lstStyle/>
+          <a:p>
+            <a:r>
+              <a:rPr lang="en-US" dirty="0" smtClean="0"/>
+              <a:t>Example DM dataset</a:t>
+            </a:r>
+            <a:endParaRPr lang="en-US" dirty="0"/>
+          </a:p>
+        </p:txBody>
+      </p:sp>
+      <p:sp>
+        <p:nvSpPr>
+          <p:cNvPr id="3" name="Content Placeholder 2"/>
+          <p:cNvSpPr>
+            <a:spLocks noGrp="1"/>
+          </p:cNvSpPr>
+          <p:nvPr>
+            <p:ph idx="1"/>
+          </p:nvPr>
+        </p:nvSpPr>
+        <p:spPr/>
+        <p:txBody>
+          <a:bodyPr/>
+          <a:lstStyle/>
+          <a:p>
+            <a:endParaRPr lang="en-US"/>
+          </a:p>
+        </p:txBody>
+      </p:sp>
+      <p:pic>
+        <p:nvPicPr>
+          <p:cNvPr id="1026" name="Picture 2" descr="H:\GitHub\srosanba\sas-sdtm-simulator\img\dm.png"/>
+          <p:cNvPicPr>
+            <a:picLocks noChangeAspect="1" noChangeArrowheads="1"/>
+          </p:cNvPicPr>
+          <p:nvPr/>
+        </p:nvPicPr>
+        <p:blipFill>
+          <a:blip r:embed="rId2">
+            <a:extLst>
+              <a:ext uri="{28A0092B-C50C-407E-A947-70E740481C1C}">
+                <a14:useLocalDpi xmlns:a14="http://schemas.microsoft.com/office/drawing/2010/main" val="0"/>
+              </a:ext>
+            </a:extLst>
+          </a:blip>
+          <a:srcRect/>
+          <a:stretch>
+            <a:fillRect/>
+          </a:stretch>
+        </p:blipFill>
+        <p:spPr bwMode="auto">
+          <a:xfrm>
+            <a:off x="152400" y="1352886"/>
+            <a:ext cx="8899803" cy="5360699"/>
+          </a:xfrm>
+          <a:prstGeom prst="rect">
+            <a:avLst/>
+          </a:prstGeom>
+          <a:noFill/>
+          <a:extLst>
+            <a:ext uri="{909E8E84-426E-40DD-AFC4-6F175D3DCCD1}">
+              <a14:hiddenFill xmlns:a14="http://schemas.microsoft.com/office/drawing/2010/main">
+                <a:solidFill>
+                  <a:srgbClr val="FFFFFF"/>
+                </a:solidFill>
+              </a14:hiddenFill>
+            </a:ext>
+          </a:extLst>
+        </p:spPr>
+      </p:pic>
+      <p:sp>
+        <p:nvSpPr>
+          <p:cNvPr id="10" name="Rectangle 9"/>
+          <p:cNvSpPr/>
+          <p:nvPr/>
+        </p:nvSpPr>
+        <p:spPr>
+          <a:xfrm>
+            <a:off x="7216461" y="1352550"/>
+            <a:ext cx="1309609" cy="5360699"/>
+          </a:xfrm>
+          <a:prstGeom prst="rect">
+            <a:avLst/>
+          </a:prstGeom>
+          <a:noFill/>
+          <a:ln>
+            <a:solidFill>
+              <a:srgbClr val="00B0F0"/>
+            </a:solidFill>
+          </a:ln>
+        </p:spPr>
+        <p:style>
+          <a:lnRef idx="2">
+            <a:schemeClr val="accent1">
+              <a:shade val="50000"/>
+            </a:schemeClr>
+          </a:lnRef>
+          <a:fillRef idx="1">
+            <a:schemeClr val="accent1"/>
+          </a:fillRef>
+          <a:effectRef idx="0">
+            <a:schemeClr val="accent1"/>
+          </a:effectRef>
+          <a:fontRef idx="minor">
+            <a:schemeClr val="lt1"/>
+          </a:fontRef>
+        </p:style>
+        <p:txBody>
+          <a:bodyPr rtlCol="0" anchor="ctr"/>
+          <a:lstStyle/>
+          <a:p>
+            <a:pPr algn="ctr"/>
+            <a:endParaRPr lang="en-US"/>
+          </a:p>
+        </p:txBody>
+      </p:sp>
+    </p:spTree>
+    <p:extLst>
+      <p:ext uri="{BB962C8B-B14F-4D97-AF65-F5344CB8AC3E}">
+        <p14:creationId xmlns:p14="http://schemas.microsoft.com/office/powerpoint/2010/main" val="1927350821"/>
+      </p:ext>
+    </p:extLst>
+  </p:cSld>
+  <p:clrMapOvr>
+    <a:masterClrMapping/>
+  </p:clrMapOvr>
+  <p:timing>
+    <p:tnLst>
+      <p:par>
+        <p:cTn id="1" dur="indefinite" restart="never" nodeType="tmRoot"/>
+      </p:par>
+    </p:tnLst>
+  </p:timing>
+</p:sld>
+</file>
+
+<file path=ppt/slides/slide12.xml><?xml version="1.0" encoding="utf-8"?>
+<p:sld xmlns:a="http://schemas.openxmlformats.org/drawingml/2006/main" xmlns:r="http://schemas.openxmlformats.org/officeDocument/2006/relationships" xmlns:p="http://schemas.openxmlformats.org/presentationml/2006/main">
+  <p:cSld>
+    <p:spTree>
+      <p:nvGrpSpPr>
+        <p:cNvPr id="1" name=""/>
+        <p:cNvGrpSpPr/>
+        <p:nvPr/>
+      </p:nvGrpSpPr>
+      <p:grpSpPr>
+        <a:xfrm>
+          <a:off x="0" y="0"/>
+          <a:ext cx="0" cy="0"/>
+          <a:chOff x="0" y="0"/>
+          <a:chExt cx="0" cy="0"/>
+        </a:xfrm>
+      </p:grpSpPr>
+      <p:sp>
+        <p:nvSpPr>
+          <p:cNvPr id="2" name="Title 1"/>
+          <p:cNvSpPr>
+            <a:spLocks noGrp="1"/>
+          </p:cNvSpPr>
+          <p:nvPr>
+            <p:ph type="title"/>
+          </p:nvPr>
+        </p:nvSpPr>
         <p:spPr/>
         <p:txBody>
           <a:bodyPr/>
@@ -3261,10 +3838,6 @@
               </a:rPr>
               <a:t> </a:t>
             </a:r>
-            <a:endParaRPr lang="en-US" sz="2000" dirty="0" smtClean="0">
-              <a:latin typeface="Courier New" panose="02070309020205020404" pitchFamily="49" charset="0"/>
-              <a:cs typeface="Courier New" panose="02070309020205020404" pitchFamily="49" charset="0"/>
-            </a:endParaRPr>
           </a:p>
           <a:p>
             <a:pPr marL="0" indent="0">
@@ -3275,14 +3848,7 @@
                 <a:latin typeface="Courier New" panose="02070309020205020404" pitchFamily="49" charset="0"/>
                 <a:cs typeface="Courier New" panose="02070309020205020404" pitchFamily="49" charset="0"/>
               </a:rPr>
-              <a:t>   </a:t>
-            </a:r>
-            <a:r>
-              <a:rPr lang="en-US" sz="2000" dirty="0" smtClean="0">
-                <a:latin typeface="Courier New" panose="02070309020205020404" pitchFamily="49" charset="0"/>
-                <a:cs typeface="Courier New" panose="02070309020205020404" pitchFamily="49" charset="0"/>
-              </a:rPr>
-              <a:t>(…</a:t>
+              <a:t>   (…</a:t>
             </a:r>
             <a:endParaRPr lang="en-US" sz="2000" dirty="0">
               <a:latin typeface="Courier New" panose="02070309020205020404" pitchFamily="49" charset="0"/>
@@ -3333,10 +3899,6 @@
               </a:rPr>
               <a:t>);</a:t>
             </a:r>
-            <a:endParaRPr lang="en-US" sz="2000" dirty="0" smtClean="0">
-              <a:latin typeface="Courier New" panose="02070309020205020404" pitchFamily="49" charset="0"/>
-              <a:cs typeface="Courier New" panose="02070309020205020404" pitchFamily="49" charset="0"/>
-            </a:endParaRPr>
           </a:p>
           <a:p>
             <a:pPr lvl="1"/>
@@ -3464,7 +4026,7 @@
 </p:sld>
 </file>
 
-<file path=ppt/slides/slide11.xml><?xml version="1.0" encoding="utf-8"?>
+<file path=ppt/slides/slide13.xml><?xml version="1.0" encoding="utf-8"?>
 <p:sld xmlns:a="http://schemas.openxmlformats.org/drawingml/2006/main" xmlns:r="http://schemas.openxmlformats.org/officeDocument/2006/relationships" xmlns:p="http://schemas.openxmlformats.org/presentationml/2006/main">
   <p:cSld>
     <p:spTree>
@@ -3611,7 +4173,7 @@
 </p:sld>
 </file>
 
-<file path=ppt/slides/slide12.xml><?xml version="1.0" encoding="utf-8"?>
+<file path=ppt/slides/slide14.xml><?xml version="1.0" encoding="utf-8"?>
 <p:sld xmlns:a="http://schemas.openxmlformats.org/drawingml/2006/main" xmlns:r="http://schemas.openxmlformats.org/officeDocument/2006/relationships" xmlns:p="http://schemas.openxmlformats.org/presentationml/2006/main">
   <p:cSld>
     <p:spTree>
@@ -3862,7 +4424,7 @@
 </p:sld>
 </file>
 
-<file path=ppt/slides/slide13.xml><?xml version="1.0" encoding="utf-8"?>
+<file path=ppt/slides/slide15.xml><?xml version="1.0" encoding="utf-8"?>
 <p:sld xmlns:a="http://schemas.openxmlformats.org/drawingml/2006/main" xmlns:r="http://schemas.openxmlformats.org/officeDocument/2006/relationships" xmlns:p="http://schemas.openxmlformats.org/presentationml/2006/main">
   <p:cSld>
     <p:spTree>
@@ -5533,7 +6095,7 @@
 </p:sld>
 </file>
 
-<file path=ppt/slides/slide14.xml><?xml version="1.0" encoding="utf-8"?>
+<file path=ppt/slides/slide16.xml><?xml version="1.0" encoding="utf-8"?>
 <p:sld xmlns:a="http://schemas.openxmlformats.org/drawingml/2006/main" xmlns:r="http://schemas.openxmlformats.org/officeDocument/2006/relationships" xmlns:p="http://schemas.openxmlformats.org/presentationml/2006/main">
   <p:cSld>
     <p:spTree>
@@ -5671,7 +6233,7 @@
 </p:sld>
 </file>
 
-<file path=ppt/slides/slide15.xml><?xml version="1.0" encoding="utf-8"?>
+<file path=ppt/slides/slide17.xml><?xml version="1.0" encoding="utf-8"?>
 <p:sld xmlns:a="http://schemas.openxmlformats.org/drawingml/2006/main" xmlns:r="http://schemas.openxmlformats.org/officeDocument/2006/relationships" xmlns:p="http://schemas.openxmlformats.org/presentationml/2006/main">
   <p:cSld>
     <p:spTree>
@@ -5804,7 +6366,7 @@
 </p:sld>
 </file>
 
-<file path=ppt/slides/slide16.xml><?xml version="1.0" encoding="utf-8"?>
+<file path=ppt/slides/slide18.xml><?xml version="1.0" encoding="utf-8"?>
 <p:sld xmlns:a="http://schemas.openxmlformats.org/drawingml/2006/main" xmlns:r="http://schemas.openxmlformats.org/officeDocument/2006/relationships" xmlns:p="http://schemas.openxmlformats.org/presentationml/2006/main">
   <p:cSld>
     <p:spTree>
@@ -6052,7 +6614,7 @@
 </p:sld>
 </file>
 
-<file path=ppt/slides/slide17.xml><?xml version="1.0" encoding="utf-8"?>
+<file path=ppt/slides/slide19.xml><?xml version="1.0" encoding="utf-8"?>
 <p:sld xmlns:a="http://schemas.openxmlformats.org/drawingml/2006/main" xmlns:r="http://schemas.openxmlformats.org/officeDocument/2006/relationships" xmlns:p="http://schemas.openxmlformats.org/presentationml/2006/main">
   <p:cSld>
     <p:spTree>
@@ -6852,7 +7414,334 @@
 </p:sld>
 </file>
 
-<file path=ppt/slides/slide18.xml><?xml version="1.0" encoding="utf-8"?>
+<file path=ppt/slides/slide2.xml><?xml version="1.0" encoding="utf-8"?>
+<p:sld xmlns:a="http://schemas.openxmlformats.org/drawingml/2006/main" xmlns:r="http://schemas.openxmlformats.org/officeDocument/2006/relationships" xmlns:p="http://schemas.openxmlformats.org/presentationml/2006/main">
+  <p:cSld>
+    <p:spTree>
+      <p:nvGrpSpPr>
+        <p:cNvPr id="1" name=""/>
+        <p:cNvGrpSpPr/>
+        <p:nvPr/>
+      </p:nvGrpSpPr>
+      <p:grpSpPr>
+        <a:xfrm>
+          <a:off x="0" y="0"/>
+          <a:ext cx="0" cy="0"/>
+          <a:chOff x="0" y="0"/>
+          <a:chExt cx="0" cy="0"/>
+        </a:xfrm>
+      </p:grpSpPr>
+      <p:sp>
+        <p:nvSpPr>
+          <p:cNvPr id="2" name="Title 1"/>
+          <p:cNvSpPr>
+            <a:spLocks noGrp="1"/>
+          </p:cNvSpPr>
+          <p:nvPr>
+            <p:ph type="title"/>
+          </p:nvPr>
+        </p:nvSpPr>
+        <p:spPr/>
+        <p:txBody>
+          <a:bodyPr/>
+          <a:lstStyle/>
+          <a:p>
+            <a:r>
+              <a:rPr lang="en-US" dirty="0" smtClean="0"/>
+              <a:t>What does it do?</a:t>
+            </a:r>
+            <a:endParaRPr lang="en-US" dirty="0"/>
+          </a:p>
+        </p:txBody>
+      </p:sp>
+      <p:pic>
+        <p:nvPicPr>
+          <p:cNvPr id="4" name="Picture 2" descr="H:\GitHub\srosanba\sas-sdtm-simulator\img\dm.png"/>
+          <p:cNvPicPr>
+            <a:picLocks noChangeAspect="1" noChangeArrowheads="1"/>
+          </p:cNvPicPr>
+          <p:nvPr/>
+        </p:nvPicPr>
+        <p:blipFill rotWithShape="1">
+          <a:blip r:embed="rId2">
+            <a:extLst>
+              <a:ext uri="{28A0092B-C50C-407E-A947-70E740481C1C}">
+                <a14:useLocalDpi xmlns:a14="http://schemas.microsoft.com/office/drawing/2010/main" val="0"/>
+              </a:ext>
+            </a:extLst>
+          </a:blip>
+          <a:srcRect r="7744" b="55941"/>
+          <a:stretch/>
+        </p:blipFill>
+        <p:spPr bwMode="auto">
+          <a:xfrm>
+            <a:off x="76200" y="1352887"/>
+            <a:ext cx="8210550" cy="2361864"/>
+          </a:xfrm>
+          <a:prstGeom prst="rect">
+            <a:avLst/>
+          </a:prstGeom>
+          <a:noFill/>
+          <a:ln>
+            <a:solidFill>
+              <a:schemeClr val="accent1"/>
+            </a:solidFill>
+          </a:ln>
+          <a:extLst>
+            <a:ext uri="{909E8E84-426E-40DD-AFC4-6F175D3DCCD1}">
+              <a14:hiddenFill xmlns:a14="http://schemas.microsoft.com/office/drawing/2010/main">
+                <a:solidFill>
+                  <a:srgbClr val="FFFFFF"/>
+                </a:solidFill>
+              </a14:hiddenFill>
+            </a:ext>
+          </a:extLst>
+        </p:spPr>
+      </p:pic>
+      <p:pic>
+        <p:nvPicPr>
+          <p:cNvPr id="5" name="Picture 2"/>
+          <p:cNvPicPr>
+            <a:picLocks noChangeAspect="1" noChangeArrowheads="1"/>
+          </p:cNvPicPr>
+          <p:nvPr/>
+        </p:nvPicPr>
+        <p:blipFill rotWithShape="1">
+          <a:blip r:embed="rId3">
+            <a:extLst>
+              <a:ext uri="{28A0092B-C50C-407E-A947-70E740481C1C}">
+                <a14:useLocalDpi xmlns:a14="http://schemas.microsoft.com/office/drawing/2010/main" val="0"/>
+              </a:ext>
+            </a:extLst>
+          </a:blip>
+          <a:srcRect r="15689" b="26990"/>
+          <a:stretch/>
+        </p:blipFill>
+        <p:spPr bwMode="auto">
+          <a:xfrm>
+            <a:off x="990600" y="2247900"/>
+            <a:ext cx="7505700" cy="3390900"/>
+          </a:xfrm>
+          <a:prstGeom prst="rect">
+            <a:avLst/>
+          </a:prstGeom>
+          <a:noFill/>
+          <a:ln w="9525">
+            <a:solidFill>
+              <a:schemeClr val="tx1"/>
+            </a:solidFill>
+            <a:miter lim="800000"/>
+            <a:headEnd/>
+            <a:tailEnd/>
+          </a:ln>
+          <a:extLst>
+            <a:ext uri="{909E8E84-426E-40DD-AFC4-6F175D3DCCD1}">
+              <a14:hiddenFill xmlns:a14="http://schemas.microsoft.com/office/drawing/2010/main">
+                <a:solidFill>
+                  <a:schemeClr val="accent1"/>
+                </a:solidFill>
+              </a14:hiddenFill>
+            </a:ext>
+          </a:extLst>
+        </p:spPr>
+      </p:pic>
+      <p:pic>
+        <p:nvPicPr>
+          <p:cNvPr id="6" name="Picture 2"/>
+          <p:cNvPicPr>
+            <a:picLocks noChangeAspect="1" noChangeArrowheads="1"/>
+          </p:cNvPicPr>
+          <p:nvPr/>
+        </p:nvPicPr>
+        <p:blipFill rotWithShape="1">
+          <a:blip r:embed="rId4">
+            <a:extLst>
+              <a:ext uri="{28A0092B-C50C-407E-A947-70E740481C1C}">
+                <a14:useLocalDpi xmlns:a14="http://schemas.microsoft.com/office/drawing/2010/main" val="0"/>
+              </a:ext>
+            </a:extLst>
+          </a:blip>
+          <a:srcRect l="12884" r="6161" b="28758"/>
+          <a:stretch/>
+        </p:blipFill>
+        <p:spPr bwMode="auto">
+          <a:xfrm>
+            <a:off x="1447800" y="3352013"/>
+            <a:ext cx="7573085" cy="3258338"/>
+          </a:xfrm>
+          <a:prstGeom prst="rect">
+            <a:avLst/>
+          </a:prstGeom>
+          <a:noFill/>
+          <a:ln w="9525">
+            <a:solidFill>
+              <a:schemeClr val="tx1"/>
+            </a:solidFill>
+            <a:miter lim="800000"/>
+            <a:headEnd/>
+            <a:tailEnd/>
+          </a:ln>
+          <a:extLst>
+            <a:ext uri="{909E8E84-426E-40DD-AFC4-6F175D3DCCD1}">
+              <a14:hiddenFill xmlns:a14="http://schemas.microsoft.com/office/drawing/2010/main">
+                <a:solidFill>
+                  <a:schemeClr val="accent1"/>
+                </a:solidFill>
+              </a14:hiddenFill>
+            </a:ext>
+          </a:extLst>
+        </p:spPr>
+      </p:pic>
+    </p:spTree>
+    <p:extLst>
+      <p:ext uri="{BB962C8B-B14F-4D97-AF65-F5344CB8AC3E}">
+        <p14:creationId xmlns:p14="http://schemas.microsoft.com/office/powerpoint/2010/main" val="2093993009"/>
+      </p:ext>
+    </p:extLst>
+  </p:cSld>
+  <p:clrMapOvr>
+    <a:masterClrMapping/>
+  </p:clrMapOvr>
+  <p:timing>
+    <p:tnLst>
+      <p:par>
+        <p:cTn id="1" dur="indefinite" restart="never" nodeType="tmRoot">
+          <p:childTnLst>
+            <p:seq concurrent="1" nextAc="seek">
+              <p:cTn id="2" dur="indefinite" nodeType="mainSeq">
+                <p:childTnLst>
+                  <p:par>
+                    <p:cTn id="3" fill="hold">
+                      <p:stCondLst>
+                        <p:cond delay="indefinite"/>
+                      </p:stCondLst>
+                      <p:childTnLst>
+                        <p:par>
+                          <p:cTn id="4" fill="hold">
+                            <p:stCondLst>
+                              <p:cond delay="0"/>
+                            </p:stCondLst>
+                            <p:childTnLst>
+                              <p:par>
+                                <p:cTn id="5" presetID="10" presetClass="entr" presetSubtype="0" fill="hold" nodeType="clickEffect">
+                                  <p:stCondLst>
+                                    <p:cond delay="0"/>
+                                  </p:stCondLst>
+                                  <p:childTnLst>
+                                    <p:set>
+                                      <p:cBhvr>
+                                        <p:cTn id="6" dur="1" fill="hold">
+                                          <p:stCondLst>
+                                            <p:cond delay="0"/>
+                                          </p:stCondLst>
+                                        </p:cTn>
+                                        <p:tgtEl>
+                                          <p:spTgt spid="5"/>
+                                        </p:tgtEl>
+                                        <p:attrNameLst>
+                                          <p:attrName>style.visibility</p:attrName>
+                                        </p:attrNameLst>
+                                      </p:cBhvr>
+                                      <p:to>
+                                        <p:strVal val="visible"/>
+                                      </p:to>
+                                    </p:set>
+                                    <p:animEffect transition="in" filter="fade">
+                                      <p:cBhvr>
+                                        <p:cTn id="7" dur="500"/>
+                                        <p:tgtEl>
+                                          <p:spTgt spid="5"/>
+                                        </p:tgtEl>
+                                      </p:cBhvr>
+                                    </p:animEffect>
+                                  </p:childTnLst>
+                                </p:cTn>
+                              </p:par>
+                            </p:childTnLst>
+                          </p:cTn>
+                        </p:par>
+                      </p:childTnLst>
+                    </p:cTn>
+                  </p:par>
+                  <p:par>
+                    <p:cTn id="8" fill="hold">
+                      <p:stCondLst>
+                        <p:cond delay="indefinite"/>
+                      </p:stCondLst>
+                      <p:childTnLst>
+                        <p:par>
+                          <p:cTn id="9" fill="hold">
+                            <p:stCondLst>
+                              <p:cond delay="0"/>
+                            </p:stCondLst>
+                            <p:childTnLst>
+                              <p:par>
+                                <p:cTn id="10" presetID="10" presetClass="entr" presetSubtype="0" fill="hold" nodeType="clickEffect">
+                                  <p:stCondLst>
+                                    <p:cond delay="0"/>
+                                  </p:stCondLst>
+                                  <p:childTnLst>
+                                    <p:set>
+                                      <p:cBhvr>
+                                        <p:cTn id="11" dur="1" fill="hold">
+                                          <p:stCondLst>
+                                            <p:cond delay="0"/>
+                                          </p:stCondLst>
+                                        </p:cTn>
+                                        <p:tgtEl>
+                                          <p:spTgt spid="6"/>
+                                        </p:tgtEl>
+                                        <p:attrNameLst>
+                                          <p:attrName>style.visibility</p:attrName>
+                                        </p:attrNameLst>
+                                      </p:cBhvr>
+                                      <p:to>
+                                        <p:strVal val="visible"/>
+                                      </p:to>
+                                    </p:set>
+                                    <p:animEffect transition="in" filter="fade">
+                                      <p:cBhvr>
+                                        <p:cTn id="12" dur="500"/>
+                                        <p:tgtEl>
+                                          <p:spTgt spid="6"/>
+                                        </p:tgtEl>
+                                      </p:cBhvr>
+                                    </p:animEffect>
+                                  </p:childTnLst>
+                                </p:cTn>
+                              </p:par>
+                            </p:childTnLst>
+                          </p:cTn>
+                        </p:par>
+                      </p:childTnLst>
+                    </p:cTn>
+                  </p:par>
+                </p:childTnLst>
+              </p:cTn>
+              <p:prevCondLst>
+                <p:cond evt="onPrev" delay="0">
+                  <p:tgtEl>
+                    <p:sldTgt/>
+                  </p:tgtEl>
+                </p:cond>
+              </p:prevCondLst>
+              <p:nextCondLst>
+                <p:cond evt="onNext" delay="0">
+                  <p:tgtEl>
+                    <p:sldTgt/>
+                  </p:tgtEl>
+                </p:cond>
+              </p:nextCondLst>
+            </p:seq>
+          </p:childTnLst>
+        </p:cTn>
+      </p:par>
+    </p:tnLst>
+  </p:timing>
+</p:sld>
+</file>
+
+<file path=ppt/slides/slide20.xml><?xml version="1.0" encoding="utf-8"?>
 <p:sld xmlns:a="http://schemas.openxmlformats.org/drawingml/2006/main" xmlns:r="http://schemas.openxmlformats.org/officeDocument/2006/relationships" xmlns:p="http://schemas.openxmlformats.org/presentationml/2006/main">
   <p:cSld>
     <p:spTree>
@@ -6990,7 +7879,7 @@
 </p:sld>
 </file>
 
-<file path=ppt/slides/slide19.xml><?xml version="1.0" encoding="utf-8"?>
+<file path=ppt/slides/slide21.xml><?xml version="1.0" encoding="utf-8"?>
 <p:sld xmlns:a="http://schemas.openxmlformats.org/drawingml/2006/main" xmlns:r="http://schemas.openxmlformats.org/officeDocument/2006/relationships" xmlns:p="http://schemas.openxmlformats.org/presentationml/2006/main">
   <p:cSld>
     <p:spTree>
@@ -7191,114 +8080,7 @@
 </p:sld>
 </file>
 
-<file path=ppt/slides/slide2.xml><?xml version="1.0" encoding="utf-8"?>
-<p:sld xmlns:a="http://schemas.openxmlformats.org/drawingml/2006/main" xmlns:r="http://schemas.openxmlformats.org/officeDocument/2006/relationships" xmlns:p="http://schemas.openxmlformats.org/presentationml/2006/main">
-  <p:cSld>
-    <p:spTree>
-      <p:nvGrpSpPr>
-        <p:cNvPr id="1" name=""/>
-        <p:cNvGrpSpPr/>
-        <p:nvPr/>
-      </p:nvGrpSpPr>
-      <p:grpSpPr>
-        <a:xfrm>
-          <a:off x="0" y="0"/>
-          <a:ext cx="0" cy="0"/>
-          <a:chOff x="0" y="0"/>
-          <a:chExt cx="0" cy="0"/>
-        </a:xfrm>
-      </p:grpSpPr>
-      <p:sp>
-        <p:nvSpPr>
-          <p:cNvPr id="2" name="Title 1"/>
-          <p:cNvSpPr>
-            <a:spLocks noGrp="1"/>
-          </p:cNvSpPr>
-          <p:nvPr>
-            <p:ph type="title"/>
-          </p:nvPr>
-        </p:nvSpPr>
-        <p:spPr/>
-        <p:txBody>
-          <a:bodyPr/>
-          <a:lstStyle/>
-          <a:p>
-            <a:r>
-              <a:rPr lang="en-US" dirty="0" smtClean="0"/>
-              <a:t>Current capabilities</a:t>
-            </a:r>
-            <a:endParaRPr lang="en-US" dirty="0"/>
-          </a:p>
-        </p:txBody>
-      </p:sp>
-      <p:sp>
-        <p:nvSpPr>
-          <p:cNvPr id="3" name="Content Placeholder 2"/>
-          <p:cNvSpPr>
-            <a:spLocks noGrp="1"/>
-          </p:cNvSpPr>
-          <p:nvPr>
-            <p:ph idx="1"/>
-          </p:nvPr>
-        </p:nvSpPr>
-        <p:spPr/>
-        <p:txBody>
-          <a:bodyPr/>
-          <a:lstStyle/>
-          <a:p>
-            <a:r>
-              <a:rPr lang="en-US" dirty="0" smtClean="0"/>
-              <a:t>Demographics (DM)</a:t>
-            </a:r>
-          </a:p>
-          <a:p>
-            <a:r>
-              <a:rPr lang="en-US" dirty="0"/>
-              <a:t>Events (AE)</a:t>
-            </a:r>
-          </a:p>
-          <a:p>
-            <a:r>
-              <a:rPr lang="en-US" dirty="0" smtClean="0"/>
-              <a:t>Subject </a:t>
-            </a:r>
-            <a:r>
-              <a:rPr lang="en-US" dirty="0" smtClean="0"/>
-              <a:t>Visits (SV)</a:t>
-            </a:r>
-          </a:p>
-          <a:p>
-            <a:r>
-              <a:rPr lang="en-US" dirty="0" smtClean="0"/>
-              <a:t>Findings (EG, LB, VS)</a:t>
-            </a:r>
-          </a:p>
-          <a:p>
-            <a:endParaRPr lang="en-US" dirty="0"/>
-          </a:p>
-        </p:txBody>
-      </p:sp>
-    </p:spTree>
-    <p:extLst>
-      <p:ext uri="{BB962C8B-B14F-4D97-AF65-F5344CB8AC3E}">
-        <p14:creationId xmlns:p14="http://schemas.microsoft.com/office/powerpoint/2010/main" val="786166402"/>
-      </p:ext>
-    </p:extLst>
-  </p:cSld>
-  <p:clrMapOvr>
-    <a:masterClrMapping/>
-  </p:clrMapOvr>
-  <p:timing>
-    <p:tnLst>
-      <p:par>
-        <p:cTn id="1" dur="indefinite" restart="never" nodeType="tmRoot"/>
-      </p:par>
-    </p:tnLst>
-  </p:timing>
-</p:sld>
-</file>
-
-<file path=ppt/slides/slide20.xml><?xml version="1.0" encoding="utf-8"?>
+<file path=ppt/slides/slide22.xml><?xml version="1.0" encoding="utf-8"?>
 <p:sld xmlns:a="http://schemas.openxmlformats.org/drawingml/2006/main" xmlns:r="http://schemas.openxmlformats.org/officeDocument/2006/relationships" xmlns:p="http://schemas.openxmlformats.org/presentationml/2006/main">
   <p:cSld>
     <p:spTree>
@@ -9789,7 +10571,7 @@
 </p:sld>
 </file>
 
-<file path=ppt/slides/slide21.xml><?xml version="1.0" encoding="utf-8"?>
+<file path=ppt/slides/slide23.xml><?xml version="1.0" encoding="utf-8"?>
 <p:sld xmlns:a="http://schemas.openxmlformats.org/drawingml/2006/main" xmlns:r="http://schemas.openxmlformats.org/officeDocument/2006/relationships" xmlns:p="http://schemas.openxmlformats.org/presentationml/2006/main">
   <p:cSld>
     <p:spTree>
@@ -10036,7 +10818,7 @@
 </p:sld>
 </file>
 
-<file path=ppt/slides/slide22.xml><?xml version="1.0" encoding="utf-8"?>
+<file path=ppt/slides/slide24.xml><?xml version="1.0" encoding="utf-8"?>
 <p:sld xmlns:a="http://schemas.openxmlformats.org/drawingml/2006/main" xmlns:r="http://schemas.openxmlformats.org/officeDocument/2006/relationships" xmlns:p="http://schemas.openxmlformats.org/presentationml/2006/main">
   <p:cSld>
     <p:spTree>
@@ -10243,7 +11025,7 @@
 </p:sld>
 </file>
 
-<file path=ppt/slides/slide23.xml><?xml version="1.0" encoding="utf-8"?>
+<file path=ppt/slides/slide25.xml><?xml version="1.0" encoding="utf-8"?>
 <p:sld xmlns:a="http://schemas.openxmlformats.org/drawingml/2006/main" xmlns:r="http://schemas.openxmlformats.org/officeDocument/2006/relationships" xmlns:p="http://schemas.openxmlformats.org/presentationml/2006/main">
   <p:cSld>
     <p:spTree>
@@ -10396,7 +11178,7 @@
 </p:sld>
 </file>
 
-<file path=ppt/slides/slide24.xml><?xml version="1.0" encoding="utf-8"?>
+<file path=ppt/slides/slide26.xml><?xml version="1.0" encoding="utf-8"?>
 <p:sld xmlns:a="http://schemas.openxmlformats.org/drawingml/2006/main" xmlns:r="http://schemas.openxmlformats.org/officeDocument/2006/relationships" xmlns:p="http://schemas.openxmlformats.org/presentationml/2006/main">
   <p:cSld>
     <p:spTree>
@@ -11927,7 +12709,7 @@
 </p:sld>
 </file>
 
-<file path=ppt/slides/slide25.xml><?xml version="1.0" encoding="utf-8"?>
+<file path=ppt/slides/slide27.xml><?xml version="1.0" encoding="utf-8"?>
 <p:sld xmlns:a="http://schemas.openxmlformats.org/drawingml/2006/main" xmlns:r="http://schemas.openxmlformats.org/officeDocument/2006/relationships" xmlns:p="http://schemas.openxmlformats.org/presentationml/2006/main">
   <p:cSld>
     <p:spTree>
@@ -12028,7 +12810,7 @@
 </p:sld>
 </file>
 
-<file path=ppt/slides/slide26.xml><?xml version="1.0" encoding="utf-8"?>
+<file path=ppt/slides/slide28.xml><?xml version="1.0" encoding="utf-8"?>
 <p:sld xmlns:a="http://schemas.openxmlformats.org/drawingml/2006/main" xmlns:r="http://schemas.openxmlformats.org/officeDocument/2006/relationships" xmlns:p="http://schemas.openxmlformats.org/presentationml/2006/main">
   <p:cSld>
     <p:spTree>
@@ -12235,7 +13017,7 @@
 </p:sld>
 </file>
 
-<file path=ppt/slides/slide27.xml><?xml version="1.0" encoding="utf-8"?>
+<file path=ppt/slides/slide29.xml><?xml version="1.0" encoding="utf-8"?>
 <p:sld xmlns:a="http://schemas.openxmlformats.org/drawingml/2006/main" xmlns:r="http://schemas.openxmlformats.org/officeDocument/2006/relationships" xmlns:p="http://schemas.openxmlformats.org/presentationml/2006/main">
   <p:cSld>
     <p:spTree>
@@ -12482,7 +13264,7 @@
 </p:sld>
 </file>
 
-<file path=ppt/slides/slide28.xml><?xml version="1.0" encoding="utf-8"?>
+<file path=ppt/slides/slide3.xml><?xml version="1.0" encoding="utf-8"?>
 <p:sld xmlns:a="http://schemas.openxmlformats.org/drawingml/2006/main" xmlns:r="http://schemas.openxmlformats.org/officeDocument/2006/relationships" xmlns:p="http://schemas.openxmlformats.org/presentationml/2006/main">
   <p:cSld>
     <p:spTree>
@@ -12516,6 +13298,133 @@
           <a:p>
             <a:r>
               <a:rPr lang="en-US" dirty="0" smtClean="0"/>
+              <a:t>Why does it exist?</a:t>
+            </a:r>
+            <a:endParaRPr lang="en-US" dirty="0"/>
+          </a:p>
+        </p:txBody>
+      </p:sp>
+      <p:sp>
+        <p:nvSpPr>
+          <p:cNvPr id="3" name="Content Placeholder 2"/>
+          <p:cNvSpPr>
+            <a:spLocks noGrp="1"/>
+          </p:cNvSpPr>
+          <p:nvPr>
+            <p:ph idx="1"/>
+          </p:nvPr>
+        </p:nvSpPr>
+        <p:spPr/>
+        <p:txBody>
+          <a:bodyPr>
+            <a:normAutofit lnSpcReduction="10000"/>
+          </a:bodyPr>
+          <a:lstStyle/>
+          <a:p>
+            <a:r>
+              <a:rPr lang="en-US" dirty="0" smtClean="0"/>
+              <a:t>You </a:t>
+            </a:r>
+            <a:r>
+              <a:rPr lang="en-US" dirty="0"/>
+              <a:t>may have heard that we had some clinical data stolen last year. </a:t>
+            </a:r>
+            <a:endParaRPr lang="en-US" dirty="0" smtClean="0"/>
+          </a:p>
+          <a:p>
+            <a:r>
+              <a:rPr lang="en-US" dirty="0" smtClean="0"/>
+              <a:t>We </a:t>
+            </a:r>
+            <a:r>
+              <a:rPr lang="en-US" dirty="0"/>
+              <a:t>were using real (</a:t>
+            </a:r>
+            <a:r>
+              <a:rPr lang="en-US" dirty="0" err="1"/>
+              <a:t>deidentified</a:t>
+            </a:r>
+            <a:r>
+              <a:rPr lang="en-US" dirty="0"/>
+              <a:t>) clinical data on a cloud hosting service to test a new tool (</a:t>
+            </a:r>
+            <a:r>
+              <a:rPr lang="en-US" dirty="0" err="1"/>
+              <a:t>ChartFoundry</a:t>
+            </a:r>
+            <a:r>
+              <a:rPr lang="en-US" dirty="0"/>
+              <a:t>) because ... well, because that was the only decent option available. </a:t>
+            </a:r>
+            <a:endParaRPr lang="en-US" dirty="0" smtClean="0"/>
+          </a:p>
+          <a:p>
+            <a:r>
+              <a:rPr lang="en-US" dirty="0" smtClean="0"/>
+              <a:t>After </a:t>
+            </a:r>
+            <a:r>
+              <a:rPr lang="en-US" dirty="0"/>
+              <a:t>that painful experience, we decided to invest in a set of more robust tools for data simulation. </a:t>
+            </a:r>
+            <a:endParaRPr lang="en-US" dirty="0" smtClean="0"/>
+          </a:p>
+        </p:txBody>
+      </p:sp>
+    </p:spTree>
+    <p:extLst>
+      <p:ext uri="{BB962C8B-B14F-4D97-AF65-F5344CB8AC3E}">
+        <p14:creationId xmlns:p14="http://schemas.microsoft.com/office/powerpoint/2010/main" val="552743407"/>
+      </p:ext>
+    </p:extLst>
+  </p:cSld>
+  <p:clrMapOvr>
+    <a:masterClrMapping/>
+  </p:clrMapOvr>
+  <p:timing>
+    <p:tnLst>
+      <p:par>
+        <p:cTn id="1" dur="indefinite" restart="never" nodeType="tmRoot"/>
+      </p:par>
+    </p:tnLst>
+  </p:timing>
+</p:sld>
+</file>
+
+<file path=ppt/slides/slide30.xml><?xml version="1.0" encoding="utf-8"?>
+<p:sld xmlns:a="http://schemas.openxmlformats.org/drawingml/2006/main" xmlns:r="http://schemas.openxmlformats.org/officeDocument/2006/relationships" xmlns:p="http://schemas.openxmlformats.org/presentationml/2006/main">
+  <p:cSld>
+    <p:spTree>
+      <p:nvGrpSpPr>
+        <p:cNvPr id="1" name=""/>
+        <p:cNvGrpSpPr/>
+        <p:nvPr/>
+      </p:nvGrpSpPr>
+      <p:grpSpPr>
+        <a:xfrm>
+          <a:off x="0" y="0"/>
+          <a:ext cx="0" cy="0"/>
+          <a:chOff x="0" y="0"/>
+          <a:chExt cx="0" cy="0"/>
+        </a:xfrm>
+      </p:grpSpPr>
+      <p:sp>
+        <p:nvSpPr>
+          <p:cNvPr id="2" name="Title 1"/>
+          <p:cNvSpPr>
+            <a:spLocks noGrp="1"/>
+          </p:cNvSpPr>
+          <p:nvPr>
+            <p:ph type="title"/>
+          </p:nvPr>
+        </p:nvSpPr>
+        <p:spPr/>
+        <p:txBody>
+          <a:bodyPr/>
+          <a:lstStyle/>
+          <a:p>
+            <a:r>
+              <a:rPr lang="en-US" dirty="0" smtClean="0"/>
               <a:t>Limitations</a:t>
             </a:r>
             <a:endParaRPr lang="en-US" dirty="0"/>
@@ -12602,7 +13511,7 @@
 </p:sld>
 </file>
 
-<file path=ppt/slides/slide29.xml><?xml version="1.0" encoding="utf-8"?>
+<file path=ppt/slides/slide31.xml><?xml version="1.0" encoding="utf-8"?>
 <p:sld xmlns:a="http://schemas.openxmlformats.org/drawingml/2006/main" xmlns:r="http://schemas.openxmlformats.org/officeDocument/2006/relationships" xmlns:p="http://schemas.openxmlformats.org/presentationml/2006/main">
   <p:cSld>
     <p:spTree>
@@ -13774,7 +14683,7 @@
 </p:sld>
 </file>
 
-<file path=ppt/slides/slide3.xml><?xml version="1.0" encoding="utf-8"?>
+<file path=ppt/slides/slide32.xml><?xml version="1.0" encoding="utf-8"?>
 <p:sld xmlns:a="http://schemas.openxmlformats.org/drawingml/2006/main" xmlns:r="http://schemas.openxmlformats.org/officeDocument/2006/relationships" xmlns:p="http://schemas.openxmlformats.org/presentationml/2006/main">
   <p:cSld>
     <p:spTree>
@@ -13808,8 +14717,1113 @@
           <a:p>
             <a:r>
               <a:rPr lang="en-US" dirty="0" smtClean="0"/>
-              <a:t>Dependencies</a:t>
-            </a:r>
+              <a:t>Unboxing</a:t>
+            </a:r>
+            <a:endParaRPr lang="en-US" dirty="0"/>
+          </a:p>
+        </p:txBody>
+      </p:sp>
+      <p:pic>
+        <p:nvPicPr>
+          <p:cNvPr id="1026" name="Picture 2"/>
+          <p:cNvPicPr>
+            <a:picLocks noChangeAspect="1" noChangeArrowheads="1"/>
+          </p:cNvPicPr>
+          <p:nvPr/>
+        </p:nvPicPr>
+        <p:blipFill>
+          <a:blip r:embed="rId2">
+            <a:extLst>
+              <a:ext uri="{28A0092B-C50C-407E-A947-70E740481C1C}">
+                <a14:useLocalDpi xmlns:a14="http://schemas.microsoft.com/office/drawing/2010/main" val="0"/>
+              </a:ext>
+            </a:extLst>
+          </a:blip>
+          <a:srcRect/>
+          <a:stretch>
+            <a:fillRect/>
+          </a:stretch>
+        </p:blipFill>
+        <p:spPr bwMode="auto">
+          <a:xfrm>
+            <a:off x="2743200" y="1619250"/>
+            <a:ext cx="3695700" cy="3409950"/>
+          </a:xfrm>
+          <a:prstGeom prst="rect">
+            <a:avLst/>
+          </a:prstGeom>
+          <a:noFill/>
+          <a:ln>
+            <a:solidFill>
+              <a:schemeClr val="tx1"/>
+            </a:solidFill>
+          </a:ln>
+        </p:spPr>
+      </p:pic>
+    </p:spTree>
+    <p:extLst>
+      <p:ext uri="{BB962C8B-B14F-4D97-AF65-F5344CB8AC3E}">
+        <p14:creationId xmlns:p14="http://schemas.microsoft.com/office/powerpoint/2010/main" val="2132497909"/>
+      </p:ext>
+    </p:extLst>
+  </p:cSld>
+  <p:clrMapOvr>
+    <a:masterClrMapping/>
+  </p:clrMapOvr>
+  <p:timing>
+    <p:tnLst>
+      <p:par>
+        <p:cTn id="1" dur="indefinite" restart="never" nodeType="tmRoot"/>
+      </p:par>
+    </p:tnLst>
+  </p:timing>
+</p:sld>
+</file>
+
+<file path=ppt/slides/slide33.xml><?xml version="1.0" encoding="utf-8"?>
+<p:sld xmlns:a="http://schemas.openxmlformats.org/drawingml/2006/main" xmlns:r="http://schemas.openxmlformats.org/officeDocument/2006/relationships" xmlns:p="http://schemas.openxmlformats.org/presentationml/2006/main">
+  <p:cSld>
+    <p:spTree>
+      <p:nvGrpSpPr>
+        <p:cNvPr id="1" name=""/>
+        <p:cNvGrpSpPr/>
+        <p:nvPr/>
+      </p:nvGrpSpPr>
+      <p:grpSpPr>
+        <a:xfrm>
+          <a:off x="0" y="0"/>
+          <a:ext cx="0" cy="0"/>
+          <a:chOff x="0" y="0"/>
+          <a:chExt cx="0" cy="0"/>
+        </a:xfrm>
+      </p:grpSpPr>
+      <p:sp>
+        <p:nvSpPr>
+          <p:cNvPr id="2" name="Title 1"/>
+          <p:cNvSpPr>
+            <a:spLocks noGrp="1"/>
+          </p:cNvSpPr>
+          <p:nvPr>
+            <p:ph type="title"/>
+          </p:nvPr>
+        </p:nvSpPr>
+        <p:spPr/>
+        <p:txBody>
+          <a:bodyPr/>
+          <a:lstStyle/>
+          <a:p>
+            <a:r>
+              <a:rPr lang="en-US" dirty="0" smtClean="0"/>
+              <a:t>Unboxing</a:t>
+            </a:r>
+            <a:endParaRPr lang="en-US" dirty="0"/>
+          </a:p>
+        </p:txBody>
+      </p:sp>
+      <p:pic>
+        <p:nvPicPr>
+          <p:cNvPr id="1028" name="Picture 4"/>
+          <p:cNvPicPr>
+            <a:picLocks noChangeAspect="1" noChangeArrowheads="1"/>
+          </p:cNvPicPr>
+          <p:nvPr/>
+        </p:nvPicPr>
+        <p:blipFill>
+          <a:blip r:embed="rId2">
+            <a:extLst>
+              <a:ext uri="{28A0092B-C50C-407E-A947-70E740481C1C}">
+                <a14:useLocalDpi xmlns:a14="http://schemas.microsoft.com/office/drawing/2010/main" val="0"/>
+              </a:ext>
+            </a:extLst>
+          </a:blip>
+          <a:srcRect/>
+          <a:stretch>
+            <a:fillRect/>
+          </a:stretch>
+        </p:blipFill>
+        <p:spPr bwMode="auto">
+          <a:xfrm>
+            <a:off x="304800" y="1234629"/>
+            <a:ext cx="3046425" cy="5549690"/>
+          </a:xfrm>
+          <a:prstGeom prst="rect">
+            <a:avLst/>
+          </a:prstGeom>
+          <a:noFill/>
+          <a:ln w="9525">
+            <a:solidFill>
+              <a:schemeClr val="tx1"/>
+            </a:solidFill>
+            <a:miter lim="800000"/>
+            <a:headEnd/>
+            <a:tailEnd/>
+          </a:ln>
+          <a:extLst>
+            <a:ext uri="{909E8E84-426E-40DD-AFC4-6F175D3DCCD1}">
+              <a14:hiddenFill xmlns:a14="http://schemas.microsoft.com/office/drawing/2010/main">
+                <a:solidFill>
+                  <a:schemeClr val="accent1"/>
+                </a:solidFill>
+              </a14:hiddenFill>
+            </a:ext>
+          </a:extLst>
+        </p:spPr>
+      </p:pic>
+      <p:pic>
+        <p:nvPicPr>
+          <p:cNvPr id="2050" name="Picture 2"/>
+          <p:cNvPicPr>
+            <a:picLocks noChangeAspect="1" noChangeArrowheads="1"/>
+          </p:cNvPicPr>
+          <p:nvPr/>
+        </p:nvPicPr>
+        <p:blipFill>
+          <a:blip r:embed="rId3">
+            <a:extLst>
+              <a:ext uri="{28A0092B-C50C-407E-A947-70E740481C1C}">
+                <a14:useLocalDpi xmlns:a14="http://schemas.microsoft.com/office/drawing/2010/main" val="0"/>
+              </a:ext>
+            </a:extLst>
+          </a:blip>
+          <a:srcRect/>
+          <a:stretch>
+            <a:fillRect/>
+          </a:stretch>
+        </p:blipFill>
+        <p:spPr bwMode="auto">
+          <a:xfrm>
+            <a:off x="5076825" y="1981200"/>
+            <a:ext cx="3076575" cy="3133725"/>
+          </a:xfrm>
+          <a:prstGeom prst="rect">
+            <a:avLst/>
+          </a:prstGeom>
+          <a:noFill/>
+          <a:ln w="9525">
+            <a:solidFill>
+              <a:schemeClr val="tx1"/>
+            </a:solidFill>
+            <a:miter lim="800000"/>
+            <a:headEnd/>
+            <a:tailEnd/>
+          </a:ln>
+          <a:extLst>
+            <a:ext uri="{909E8E84-426E-40DD-AFC4-6F175D3DCCD1}">
+              <a14:hiddenFill xmlns:a14="http://schemas.microsoft.com/office/drawing/2010/main">
+                <a:solidFill>
+                  <a:schemeClr val="accent1"/>
+                </a:solidFill>
+              </a14:hiddenFill>
+            </a:ext>
+          </a:extLst>
+        </p:spPr>
+      </p:pic>
+      <p:cxnSp>
+        <p:nvCxnSpPr>
+          <p:cNvPr id="4" name="Straight Arrow Connector 3"/>
+          <p:cNvCxnSpPr>
+            <a:endCxn id="5" idx="1"/>
+          </p:cNvCxnSpPr>
+          <p:nvPr/>
+        </p:nvCxnSpPr>
+        <p:spPr>
+          <a:xfrm>
+            <a:off x="1066800" y="3548063"/>
+            <a:ext cx="3429000" cy="0"/>
+          </a:xfrm>
+          <a:prstGeom prst="straightConnector1">
+            <a:avLst/>
+          </a:prstGeom>
+          <a:ln>
+            <a:tailEnd type="arrow"/>
+          </a:ln>
+        </p:spPr>
+        <p:style>
+          <a:lnRef idx="1">
+            <a:schemeClr val="accent1"/>
+          </a:lnRef>
+          <a:fillRef idx="0">
+            <a:schemeClr val="accent1"/>
+          </a:fillRef>
+          <a:effectRef idx="0">
+            <a:schemeClr val="accent1"/>
+          </a:effectRef>
+          <a:fontRef idx="minor">
+            <a:schemeClr val="tx1"/>
+          </a:fontRef>
+        </p:style>
+      </p:cxnSp>
+      <p:sp>
+        <p:nvSpPr>
+          <p:cNvPr id="5" name="Left Brace 4"/>
+          <p:cNvSpPr/>
+          <p:nvPr/>
+        </p:nvSpPr>
+        <p:spPr>
+          <a:xfrm>
+            <a:off x="4495800" y="1981200"/>
+            <a:ext cx="457200" cy="3133725"/>
+          </a:xfrm>
+          <a:prstGeom prst="leftBrace">
+            <a:avLst/>
+          </a:prstGeom>
+        </p:spPr>
+        <p:style>
+          <a:lnRef idx="1">
+            <a:schemeClr val="accent1"/>
+          </a:lnRef>
+          <a:fillRef idx="0">
+            <a:schemeClr val="accent1"/>
+          </a:fillRef>
+          <a:effectRef idx="0">
+            <a:schemeClr val="accent1"/>
+          </a:effectRef>
+          <a:fontRef idx="minor">
+            <a:schemeClr val="tx1"/>
+          </a:fontRef>
+        </p:style>
+        <p:txBody>
+          <a:bodyPr rtlCol="0" anchor="ctr"/>
+          <a:lstStyle/>
+          <a:p>
+            <a:pPr algn="ctr"/>
+            <a:endParaRPr lang="en-US"/>
+          </a:p>
+        </p:txBody>
+      </p:sp>
+    </p:spTree>
+    <p:extLst>
+      <p:ext uri="{BB962C8B-B14F-4D97-AF65-F5344CB8AC3E}">
+        <p14:creationId xmlns:p14="http://schemas.microsoft.com/office/powerpoint/2010/main" val="3664694897"/>
+      </p:ext>
+    </p:extLst>
+  </p:cSld>
+  <p:clrMapOvr>
+    <a:masterClrMapping/>
+  </p:clrMapOvr>
+  <p:timing>
+    <p:tnLst>
+      <p:par>
+        <p:cTn id="1" dur="indefinite" restart="never" nodeType="tmRoot">
+          <p:childTnLst>
+            <p:seq concurrent="1" nextAc="seek">
+              <p:cTn id="2" dur="indefinite" nodeType="mainSeq">
+                <p:childTnLst>
+                  <p:par>
+                    <p:cTn id="3" fill="hold">
+                      <p:stCondLst>
+                        <p:cond delay="indefinite"/>
+                      </p:stCondLst>
+                      <p:childTnLst>
+                        <p:par>
+                          <p:cTn id="4" fill="hold">
+                            <p:stCondLst>
+                              <p:cond delay="0"/>
+                            </p:stCondLst>
+                            <p:childTnLst>
+                              <p:par>
+                                <p:cTn id="5" presetID="10" presetClass="entr" presetSubtype="0" fill="hold" nodeType="clickEffect">
+                                  <p:stCondLst>
+                                    <p:cond delay="0"/>
+                                  </p:stCondLst>
+                                  <p:childTnLst>
+                                    <p:set>
+                                      <p:cBhvr>
+                                        <p:cTn id="6" dur="1" fill="hold">
+                                          <p:stCondLst>
+                                            <p:cond delay="0"/>
+                                          </p:stCondLst>
+                                        </p:cTn>
+                                        <p:tgtEl>
+                                          <p:spTgt spid="4"/>
+                                        </p:tgtEl>
+                                        <p:attrNameLst>
+                                          <p:attrName>style.visibility</p:attrName>
+                                        </p:attrNameLst>
+                                      </p:cBhvr>
+                                      <p:to>
+                                        <p:strVal val="visible"/>
+                                      </p:to>
+                                    </p:set>
+                                    <p:animEffect transition="in" filter="fade">
+                                      <p:cBhvr>
+                                        <p:cTn id="7" dur="500"/>
+                                        <p:tgtEl>
+                                          <p:spTgt spid="4"/>
+                                        </p:tgtEl>
+                                      </p:cBhvr>
+                                    </p:animEffect>
+                                  </p:childTnLst>
+                                </p:cTn>
+                              </p:par>
+                              <p:par>
+                                <p:cTn id="8" presetID="10" presetClass="entr" presetSubtype="0" fill="hold" grpId="0" nodeType="withEffect">
+                                  <p:stCondLst>
+                                    <p:cond delay="0"/>
+                                  </p:stCondLst>
+                                  <p:childTnLst>
+                                    <p:set>
+                                      <p:cBhvr>
+                                        <p:cTn id="9" dur="1" fill="hold">
+                                          <p:stCondLst>
+                                            <p:cond delay="0"/>
+                                          </p:stCondLst>
+                                        </p:cTn>
+                                        <p:tgtEl>
+                                          <p:spTgt spid="5"/>
+                                        </p:tgtEl>
+                                        <p:attrNameLst>
+                                          <p:attrName>style.visibility</p:attrName>
+                                        </p:attrNameLst>
+                                      </p:cBhvr>
+                                      <p:to>
+                                        <p:strVal val="visible"/>
+                                      </p:to>
+                                    </p:set>
+                                    <p:animEffect transition="in" filter="fade">
+                                      <p:cBhvr>
+                                        <p:cTn id="10" dur="500"/>
+                                        <p:tgtEl>
+                                          <p:spTgt spid="5"/>
+                                        </p:tgtEl>
+                                      </p:cBhvr>
+                                    </p:animEffect>
+                                  </p:childTnLst>
+                                </p:cTn>
+                              </p:par>
+                              <p:par>
+                                <p:cTn id="11" presetID="10" presetClass="entr" presetSubtype="0" fill="hold" nodeType="withEffect">
+                                  <p:stCondLst>
+                                    <p:cond delay="0"/>
+                                  </p:stCondLst>
+                                  <p:childTnLst>
+                                    <p:set>
+                                      <p:cBhvr>
+                                        <p:cTn id="12" dur="1" fill="hold">
+                                          <p:stCondLst>
+                                            <p:cond delay="0"/>
+                                          </p:stCondLst>
+                                        </p:cTn>
+                                        <p:tgtEl>
+                                          <p:spTgt spid="2050"/>
+                                        </p:tgtEl>
+                                        <p:attrNameLst>
+                                          <p:attrName>style.visibility</p:attrName>
+                                        </p:attrNameLst>
+                                      </p:cBhvr>
+                                      <p:to>
+                                        <p:strVal val="visible"/>
+                                      </p:to>
+                                    </p:set>
+                                    <p:animEffect transition="in" filter="fade">
+                                      <p:cBhvr>
+                                        <p:cTn id="13" dur="500"/>
+                                        <p:tgtEl>
+                                          <p:spTgt spid="2050"/>
+                                        </p:tgtEl>
+                                      </p:cBhvr>
+                                    </p:animEffect>
+                                  </p:childTnLst>
+                                </p:cTn>
+                              </p:par>
+                            </p:childTnLst>
+                          </p:cTn>
+                        </p:par>
+                      </p:childTnLst>
+                    </p:cTn>
+                  </p:par>
+                </p:childTnLst>
+              </p:cTn>
+              <p:prevCondLst>
+                <p:cond evt="onPrev" delay="0">
+                  <p:tgtEl>
+                    <p:sldTgt/>
+                  </p:tgtEl>
+                </p:cond>
+              </p:prevCondLst>
+              <p:nextCondLst>
+                <p:cond evt="onNext" delay="0">
+                  <p:tgtEl>
+                    <p:sldTgt/>
+                  </p:tgtEl>
+                </p:cond>
+              </p:nextCondLst>
+            </p:seq>
+          </p:childTnLst>
+        </p:cTn>
+      </p:par>
+    </p:tnLst>
+    <p:bldLst>
+      <p:bldP spid="5" grpId="0" animBg="1"/>
+    </p:bldLst>
+  </p:timing>
+</p:sld>
+</file>
+
+<file path=ppt/slides/slide34.xml><?xml version="1.0" encoding="utf-8"?>
+<p:sld xmlns:a="http://schemas.openxmlformats.org/drawingml/2006/main" xmlns:r="http://schemas.openxmlformats.org/officeDocument/2006/relationships" xmlns:p="http://schemas.openxmlformats.org/presentationml/2006/main">
+  <p:cSld>
+    <p:spTree>
+      <p:nvGrpSpPr>
+        <p:cNvPr id="1" name=""/>
+        <p:cNvGrpSpPr/>
+        <p:nvPr/>
+      </p:nvGrpSpPr>
+      <p:grpSpPr>
+        <a:xfrm>
+          <a:off x="0" y="0"/>
+          <a:ext cx="0" cy="0"/>
+          <a:chOff x="0" y="0"/>
+          <a:chExt cx="0" cy="0"/>
+        </a:xfrm>
+      </p:grpSpPr>
+      <p:sp>
+        <p:nvSpPr>
+          <p:cNvPr id="2" name="Title 1"/>
+          <p:cNvSpPr>
+            <a:spLocks noGrp="1"/>
+          </p:cNvSpPr>
+          <p:nvPr>
+            <p:ph type="title"/>
+          </p:nvPr>
+        </p:nvSpPr>
+        <p:spPr/>
+        <p:txBody>
+          <a:bodyPr/>
+          <a:lstStyle/>
+          <a:p>
+            <a:r>
+              <a:rPr lang="en-US" dirty="0" smtClean="0"/>
+              <a:t>Unboxing</a:t>
+            </a:r>
+            <a:endParaRPr lang="en-US" dirty="0"/>
+          </a:p>
+        </p:txBody>
+      </p:sp>
+      <p:pic>
+        <p:nvPicPr>
+          <p:cNvPr id="1027" name="Picture 3"/>
+          <p:cNvPicPr>
+            <a:picLocks noChangeAspect="1" noChangeArrowheads="1"/>
+          </p:cNvPicPr>
+          <p:nvPr/>
+        </p:nvPicPr>
+        <p:blipFill>
+          <a:blip r:embed="rId2">
+            <a:extLst>
+              <a:ext uri="{28A0092B-C50C-407E-A947-70E740481C1C}">
+                <a14:useLocalDpi xmlns:a14="http://schemas.microsoft.com/office/drawing/2010/main" val="0"/>
+              </a:ext>
+            </a:extLst>
+          </a:blip>
+          <a:srcRect/>
+          <a:stretch>
+            <a:fillRect/>
+          </a:stretch>
+        </p:blipFill>
+        <p:spPr bwMode="auto">
+          <a:xfrm>
+            <a:off x="228600" y="1313348"/>
+            <a:ext cx="3282583" cy="5392252"/>
+          </a:xfrm>
+          <a:prstGeom prst="rect">
+            <a:avLst/>
+          </a:prstGeom>
+          <a:noFill/>
+          <a:ln w="9525">
+            <a:solidFill>
+              <a:schemeClr val="tx1"/>
+            </a:solidFill>
+            <a:miter lim="800000"/>
+            <a:headEnd/>
+            <a:tailEnd/>
+          </a:ln>
+          <a:extLst>
+            <a:ext uri="{909E8E84-426E-40DD-AFC4-6F175D3DCCD1}">
+              <a14:hiddenFill xmlns:a14="http://schemas.microsoft.com/office/drawing/2010/main">
+                <a:solidFill>
+                  <a:schemeClr val="accent1"/>
+                </a:solidFill>
+              </a14:hiddenFill>
+            </a:ext>
+          </a:extLst>
+        </p:spPr>
+      </p:pic>
+      <p:pic>
+        <p:nvPicPr>
+          <p:cNvPr id="3074" name="Picture 2"/>
+          <p:cNvPicPr>
+            <a:picLocks noChangeAspect="1" noChangeArrowheads="1"/>
+          </p:cNvPicPr>
+          <p:nvPr/>
+        </p:nvPicPr>
+        <p:blipFill>
+          <a:blip r:embed="rId3">
+            <a:extLst>
+              <a:ext uri="{28A0092B-C50C-407E-A947-70E740481C1C}">
+                <a14:useLocalDpi xmlns:a14="http://schemas.microsoft.com/office/drawing/2010/main" val="0"/>
+              </a:ext>
+            </a:extLst>
+          </a:blip>
+          <a:srcRect/>
+          <a:stretch>
+            <a:fillRect/>
+          </a:stretch>
+        </p:blipFill>
+        <p:spPr bwMode="auto">
+          <a:xfrm>
+            <a:off x="3867150" y="1914525"/>
+            <a:ext cx="5124450" cy="3952875"/>
+          </a:xfrm>
+          <a:prstGeom prst="rect">
+            <a:avLst/>
+          </a:prstGeom>
+          <a:noFill/>
+          <a:ln w="9525">
+            <a:solidFill>
+              <a:schemeClr val="tx1"/>
+            </a:solidFill>
+            <a:miter lim="800000"/>
+            <a:headEnd/>
+            <a:tailEnd/>
+          </a:ln>
+          <a:extLst>
+            <a:ext uri="{909E8E84-426E-40DD-AFC4-6F175D3DCCD1}">
+              <a14:hiddenFill xmlns:a14="http://schemas.microsoft.com/office/drawing/2010/main">
+                <a:solidFill>
+                  <a:schemeClr val="accent1"/>
+                </a:solidFill>
+              </a14:hiddenFill>
+            </a:ext>
+          </a:extLst>
+        </p:spPr>
+      </p:pic>
+      <p:cxnSp>
+        <p:nvCxnSpPr>
+          <p:cNvPr id="4" name="Straight Arrow Connector 3"/>
+          <p:cNvCxnSpPr/>
+          <p:nvPr/>
+        </p:nvCxnSpPr>
+        <p:spPr>
+          <a:xfrm>
+            <a:off x="1676400" y="3352800"/>
+            <a:ext cx="2057400" cy="0"/>
+          </a:xfrm>
+          <a:prstGeom prst="straightConnector1">
+            <a:avLst/>
+          </a:prstGeom>
+          <a:ln>
+            <a:tailEnd type="arrow"/>
+          </a:ln>
+        </p:spPr>
+        <p:style>
+          <a:lnRef idx="1">
+            <a:schemeClr val="accent1"/>
+          </a:lnRef>
+          <a:fillRef idx="0">
+            <a:schemeClr val="accent1"/>
+          </a:fillRef>
+          <a:effectRef idx="0">
+            <a:schemeClr val="accent1"/>
+          </a:effectRef>
+          <a:fontRef idx="minor">
+            <a:schemeClr val="tx1"/>
+          </a:fontRef>
+        </p:style>
+      </p:cxnSp>
+      <p:sp>
+        <p:nvSpPr>
+          <p:cNvPr id="5" name="Rounded Rectangle 4"/>
+          <p:cNvSpPr/>
+          <p:nvPr/>
+        </p:nvSpPr>
+        <p:spPr>
+          <a:xfrm>
+            <a:off x="3929758" y="2124075"/>
+            <a:ext cx="4084835" cy="1446847"/>
+          </a:xfrm>
+          <a:prstGeom prst="roundRect">
+            <a:avLst/>
+          </a:prstGeom>
+          <a:noFill/>
+        </p:spPr>
+        <p:style>
+          <a:lnRef idx="2">
+            <a:schemeClr val="accent1">
+              <a:shade val="50000"/>
+            </a:schemeClr>
+          </a:lnRef>
+          <a:fillRef idx="1">
+            <a:schemeClr val="accent1"/>
+          </a:fillRef>
+          <a:effectRef idx="0">
+            <a:schemeClr val="accent1"/>
+          </a:effectRef>
+          <a:fontRef idx="minor">
+            <a:schemeClr val="lt1"/>
+          </a:fontRef>
+        </p:style>
+        <p:txBody>
+          <a:bodyPr rtlCol="0" anchor="ctr"/>
+          <a:lstStyle/>
+          <a:p>
+            <a:pPr algn="ctr"/>
+            <a:endParaRPr lang="en-US"/>
+          </a:p>
+        </p:txBody>
+      </p:sp>
+    </p:spTree>
+    <p:extLst>
+      <p:ext uri="{BB962C8B-B14F-4D97-AF65-F5344CB8AC3E}">
+        <p14:creationId xmlns:p14="http://schemas.microsoft.com/office/powerpoint/2010/main" val="388009185"/>
+      </p:ext>
+    </p:extLst>
+  </p:cSld>
+  <p:clrMapOvr>
+    <a:masterClrMapping/>
+  </p:clrMapOvr>
+  <p:timing>
+    <p:tnLst>
+      <p:par>
+        <p:cTn id="1" dur="indefinite" restart="never" nodeType="tmRoot">
+          <p:childTnLst>
+            <p:seq concurrent="1" nextAc="seek">
+              <p:cTn id="2" dur="indefinite" nodeType="mainSeq">
+                <p:childTnLst>
+                  <p:par>
+                    <p:cTn id="3" fill="hold">
+                      <p:stCondLst>
+                        <p:cond delay="indefinite"/>
+                      </p:stCondLst>
+                      <p:childTnLst>
+                        <p:par>
+                          <p:cTn id="4" fill="hold">
+                            <p:stCondLst>
+                              <p:cond delay="0"/>
+                            </p:stCondLst>
+                            <p:childTnLst>
+                              <p:par>
+                                <p:cTn id="5" presetID="10" presetClass="entr" presetSubtype="0" fill="hold" grpId="0" nodeType="clickEffect">
+                                  <p:stCondLst>
+                                    <p:cond delay="0"/>
+                                  </p:stCondLst>
+                                  <p:childTnLst>
+                                    <p:set>
+                                      <p:cBhvr>
+                                        <p:cTn id="6" dur="1" fill="hold">
+                                          <p:stCondLst>
+                                            <p:cond delay="0"/>
+                                          </p:stCondLst>
+                                        </p:cTn>
+                                        <p:tgtEl>
+                                          <p:spTgt spid="5"/>
+                                        </p:tgtEl>
+                                        <p:attrNameLst>
+                                          <p:attrName>style.visibility</p:attrName>
+                                        </p:attrNameLst>
+                                      </p:cBhvr>
+                                      <p:to>
+                                        <p:strVal val="visible"/>
+                                      </p:to>
+                                    </p:set>
+                                    <p:animEffect transition="in" filter="fade">
+                                      <p:cBhvr>
+                                        <p:cTn id="7" dur="500"/>
+                                        <p:tgtEl>
+                                          <p:spTgt spid="5"/>
+                                        </p:tgtEl>
+                                      </p:cBhvr>
+                                    </p:animEffect>
+                                  </p:childTnLst>
+                                </p:cTn>
+                              </p:par>
+                              <p:par>
+                                <p:cTn id="8" presetID="10" presetClass="entr" presetSubtype="0" fill="hold" nodeType="withEffect">
+                                  <p:stCondLst>
+                                    <p:cond delay="0"/>
+                                  </p:stCondLst>
+                                  <p:childTnLst>
+                                    <p:set>
+                                      <p:cBhvr>
+                                        <p:cTn id="9" dur="1" fill="hold">
+                                          <p:stCondLst>
+                                            <p:cond delay="0"/>
+                                          </p:stCondLst>
+                                        </p:cTn>
+                                        <p:tgtEl>
+                                          <p:spTgt spid="3074"/>
+                                        </p:tgtEl>
+                                        <p:attrNameLst>
+                                          <p:attrName>style.visibility</p:attrName>
+                                        </p:attrNameLst>
+                                      </p:cBhvr>
+                                      <p:to>
+                                        <p:strVal val="visible"/>
+                                      </p:to>
+                                    </p:set>
+                                    <p:animEffect transition="in" filter="fade">
+                                      <p:cBhvr>
+                                        <p:cTn id="10" dur="500"/>
+                                        <p:tgtEl>
+                                          <p:spTgt spid="3074"/>
+                                        </p:tgtEl>
+                                      </p:cBhvr>
+                                    </p:animEffect>
+                                  </p:childTnLst>
+                                </p:cTn>
+                              </p:par>
+                              <p:par>
+                                <p:cTn id="11" presetID="10" presetClass="entr" presetSubtype="0" fill="hold" nodeType="withEffect">
+                                  <p:stCondLst>
+                                    <p:cond delay="0"/>
+                                  </p:stCondLst>
+                                  <p:childTnLst>
+                                    <p:set>
+                                      <p:cBhvr>
+                                        <p:cTn id="12" dur="1" fill="hold">
+                                          <p:stCondLst>
+                                            <p:cond delay="0"/>
+                                          </p:stCondLst>
+                                        </p:cTn>
+                                        <p:tgtEl>
+                                          <p:spTgt spid="4"/>
+                                        </p:tgtEl>
+                                        <p:attrNameLst>
+                                          <p:attrName>style.visibility</p:attrName>
+                                        </p:attrNameLst>
+                                      </p:cBhvr>
+                                      <p:to>
+                                        <p:strVal val="visible"/>
+                                      </p:to>
+                                    </p:set>
+                                    <p:animEffect transition="in" filter="fade">
+                                      <p:cBhvr>
+                                        <p:cTn id="13" dur="500"/>
+                                        <p:tgtEl>
+                                          <p:spTgt spid="4"/>
+                                        </p:tgtEl>
+                                      </p:cBhvr>
+                                    </p:animEffect>
+                                  </p:childTnLst>
+                                </p:cTn>
+                              </p:par>
+                            </p:childTnLst>
+                          </p:cTn>
+                        </p:par>
+                      </p:childTnLst>
+                    </p:cTn>
+                  </p:par>
+                </p:childTnLst>
+              </p:cTn>
+              <p:prevCondLst>
+                <p:cond evt="onPrev" delay="0">
+                  <p:tgtEl>
+                    <p:sldTgt/>
+                  </p:tgtEl>
+                </p:cond>
+              </p:prevCondLst>
+              <p:nextCondLst>
+                <p:cond evt="onNext" delay="0">
+                  <p:tgtEl>
+                    <p:sldTgt/>
+                  </p:tgtEl>
+                </p:cond>
+              </p:nextCondLst>
+            </p:seq>
+          </p:childTnLst>
+        </p:cTn>
+      </p:par>
+    </p:tnLst>
+    <p:bldLst>
+      <p:bldP spid="5" grpId="0" animBg="1"/>
+    </p:bldLst>
+  </p:timing>
+</p:sld>
+</file>
+
+<file path=ppt/slides/slide35.xml><?xml version="1.0" encoding="utf-8"?>
+<p:sld xmlns:a="http://schemas.openxmlformats.org/drawingml/2006/main" xmlns:r="http://schemas.openxmlformats.org/officeDocument/2006/relationships" xmlns:p="http://schemas.openxmlformats.org/presentationml/2006/main">
+  <p:cSld>
+    <p:spTree>
+      <p:nvGrpSpPr>
+        <p:cNvPr id="1" name=""/>
+        <p:cNvGrpSpPr/>
+        <p:nvPr/>
+      </p:nvGrpSpPr>
+      <p:grpSpPr>
+        <a:xfrm>
+          <a:off x="0" y="0"/>
+          <a:ext cx="0" cy="0"/>
+          <a:chOff x="0" y="0"/>
+          <a:chExt cx="0" cy="0"/>
+        </a:xfrm>
+      </p:grpSpPr>
+      <p:sp>
+        <p:nvSpPr>
+          <p:cNvPr id="2" name="Title 1"/>
+          <p:cNvSpPr>
+            <a:spLocks noGrp="1"/>
+          </p:cNvSpPr>
+          <p:nvPr>
+            <p:ph type="title"/>
+          </p:nvPr>
+        </p:nvSpPr>
+        <p:spPr>
+          <a:xfrm>
+            <a:off x="457200" y="2514600"/>
+            <a:ext cx="8229600" cy="1143000"/>
+          </a:xfrm>
+        </p:spPr>
+        <p:txBody>
+          <a:bodyPr/>
+          <a:lstStyle/>
+          <a:p>
+            <a:r>
+              <a:rPr lang="en-US" dirty="0" smtClean="0"/>
+              <a:t>Questions?</a:t>
+            </a:r>
+            <a:endParaRPr lang="en-US" dirty="0"/>
+          </a:p>
+        </p:txBody>
+      </p:sp>
+    </p:spTree>
+    <p:extLst>
+      <p:ext uri="{BB962C8B-B14F-4D97-AF65-F5344CB8AC3E}">
+        <p14:creationId xmlns:p14="http://schemas.microsoft.com/office/powerpoint/2010/main" val="3393606788"/>
+      </p:ext>
+    </p:extLst>
+  </p:cSld>
+  <p:clrMapOvr>
+    <a:masterClrMapping/>
+  </p:clrMapOvr>
+  <p:timing>
+    <p:tnLst>
+      <p:par>
+        <p:cTn id="1" dur="indefinite" restart="never" nodeType="tmRoot"/>
+      </p:par>
+    </p:tnLst>
+  </p:timing>
+</p:sld>
+</file>
+
+<file path=ppt/slides/slide4.xml><?xml version="1.0" encoding="utf-8"?>
+<p:sld xmlns:a="http://schemas.openxmlformats.org/drawingml/2006/main" xmlns:r="http://schemas.openxmlformats.org/officeDocument/2006/relationships" xmlns:p="http://schemas.openxmlformats.org/presentationml/2006/main">
+  <p:cSld>
+    <p:spTree>
+      <p:nvGrpSpPr>
+        <p:cNvPr id="1" name=""/>
+        <p:cNvGrpSpPr/>
+        <p:nvPr/>
+      </p:nvGrpSpPr>
+      <p:grpSpPr>
+        <a:xfrm>
+          <a:off x="0" y="0"/>
+          <a:ext cx="0" cy="0"/>
+          <a:chOff x="0" y="0"/>
+          <a:chExt cx="0" cy="0"/>
+        </a:xfrm>
+      </p:grpSpPr>
+      <p:sp>
+        <p:nvSpPr>
+          <p:cNvPr id="2" name="Title 1"/>
+          <p:cNvSpPr>
+            <a:spLocks noGrp="1"/>
+          </p:cNvSpPr>
+          <p:nvPr>
+            <p:ph type="title"/>
+          </p:nvPr>
+        </p:nvSpPr>
+        <p:spPr/>
+        <p:txBody>
+          <a:bodyPr/>
+          <a:lstStyle/>
+          <a:p>
+            <a:r>
+              <a:rPr lang="en-US" dirty="0" smtClean="0"/>
+              <a:t>When might you use it?</a:t>
+            </a:r>
+            <a:endParaRPr lang="en-US" dirty="0"/>
+          </a:p>
+        </p:txBody>
+      </p:sp>
+      <p:sp>
+        <p:nvSpPr>
+          <p:cNvPr id="3" name="Content Placeholder 2"/>
+          <p:cNvSpPr>
+            <a:spLocks noGrp="1"/>
+          </p:cNvSpPr>
+          <p:nvPr>
+            <p:ph idx="1"/>
+          </p:nvPr>
+        </p:nvSpPr>
+        <p:spPr/>
+        <p:txBody>
+          <a:bodyPr/>
+          <a:lstStyle/>
+          <a:p>
+            <a:r>
+              <a:rPr lang="en-US" dirty="0" smtClean="0"/>
+              <a:t>Graphics</a:t>
+            </a:r>
+          </a:p>
+          <a:p>
+            <a:pPr lvl="1"/>
+            <a:r>
+              <a:rPr lang="en-US" dirty="0" smtClean="0"/>
+              <a:t>You </a:t>
+            </a:r>
+            <a:r>
+              <a:rPr lang="en-US" dirty="0"/>
+              <a:t>want to demonstrate software capabilities to a client whom you've never worked with before</a:t>
+            </a:r>
+          </a:p>
+          <a:p>
+            <a:r>
+              <a:rPr lang="en-US" dirty="0" smtClean="0"/>
+              <a:t>Stat </a:t>
+            </a:r>
+            <a:r>
+              <a:rPr lang="en-US" dirty="0" err="1" smtClean="0"/>
+              <a:t>Prog</a:t>
+            </a:r>
+            <a:endParaRPr lang="en-US" dirty="0" smtClean="0"/>
+          </a:p>
+          <a:p>
+            <a:pPr lvl="1"/>
+            <a:r>
+              <a:rPr lang="en-US" dirty="0" smtClean="0"/>
+              <a:t>You </a:t>
+            </a:r>
+            <a:r>
+              <a:rPr lang="en-US" dirty="0"/>
+              <a:t>need some SDTM data for a SUG </a:t>
+            </a:r>
+            <a:r>
+              <a:rPr lang="en-US" dirty="0" smtClean="0"/>
+              <a:t>paper</a:t>
+            </a:r>
+            <a:endParaRPr lang="en-US" dirty="0"/>
+          </a:p>
+          <a:p>
+            <a:pPr lvl="1"/>
+            <a:r>
+              <a:rPr lang="en-US" dirty="0" smtClean="0"/>
+              <a:t>You've got tight timelines and can't wait for "real" SDTM datasets before you start your ADaM </a:t>
+            </a:r>
+            <a:r>
+              <a:rPr lang="en-US" dirty="0" smtClean="0"/>
+              <a:t>work</a:t>
+            </a:r>
+          </a:p>
+          <a:p>
+            <a:pPr lvl="1"/>
+            <a:r>
+              <a:rPr lang="en-US" dirty="0" smtClean="0"/>
+              <a:t>You need to create a mock figure</a:t>
+            </a:r>
+            <a:endParaRPr lang="en-US" dirty="0" smtClean="0"/>
+          </a:p>
+        </p:txBody>
+      </p:sp>
+    </p:spTree>
+    <p:extLst>
+      <p:ext uri="{BB962C8B-B14F-4D97-AF65-F5344CB8AC3E}">
+        <p14:creationId xmlns:p14="http://schemas.microsoft.com/office/powerpoint/2010/main" val="3748637347"/>
+      </p:ext>
+    </p:extLst>
+  </p:cSld>
+  <p:clrMapOvr>
+    <a:masterClrMapping/>
+  </p:clrMapOvr>
+  <p:timing>
+    <p:tnLst>
+      <p:par>
+        <p:cTn id="1" dur="indefinite" restart="never" nodeType="tmRoot"/>
+      </p:par>
+    </p:tnLst>
+  </p:timing>
+</p:sld>
+</file>
+
+<file path=ppt/slides/slide5.xml><?xml version="1.0" encoding="utf-8"?>
+<p:sld xmlns:a="http://schemas.openxmlformats.org/drawingml/2006/main" xmlns:r="http://schemas.openxmlformats.org/officeDocument/2006/relationships" xmlns:p="http://schemas.openxmlformats.org/presentationml/2006/main">
+  <p:cSld>
+    <p:spTree>
+      <p:nvGrpSpPr>
+        <p:cNvPr id="1" name=""/>
+        <p:cNvGrpSpPr/>
+        <p:nvPr/>
+      </p:nvGrpSpPr>
+      <p:grpSpPr>
+        <a:xfrm>
+          <a:off x="0" y="0"/>
+          <a:ext cx="0" cy="0"/>
+          <a:chOff x="0" y="0"/>
+          <a:chExt cx="0" cy="0"/>
+        </a:xfrm>
+      </p:grpSpPr>
+      <p:sp>
+        <p:nvSpPr>
+          <p:cNvPr id="2" name="Title 1"/>
+          <p:cNvSpPr>
+            <a:spLocks noGrp="1"/>
+          </p:cNvSpPr>
+          <p:nvPr>
+            <p:ph type="title"/>
+          </p:nvPr>
+        </p:nvSpPr>
+        <p:spPr/>
+        <p:txBody>
+          <a:bodyPr/>
+          <a:lstStyle/>
+          <a:p>
+            <a:r>
+              <a:rPr lang="en-US" dirty="0" smtClean="0"/>
+              <a:t>Current capabilities</a:t>
+            </a:r>
+            <a:endParaRPr lang="en-US" dirty="0"/>
+          </a:p>
+        </p:txBody>
+      </p:sp>
+      <p:sp>
+        <p:nvSpPr>
+          <p:cNvPr id="3" name="Content Placeholder 2"/>
+          <p:cNvSpPr>
+            <a:spLocks noGrp="1"/>
+          </p:cNvSpPr>
+          <p:nvPr>
+            <p:ph idx="1"/>
+          </p:nvPr>
+        </p:nvSpPr>
+        <p:spPr/>
+        <p:txBody>
+          <a:bodyPr/>
+          <a:lstStyle/>
+          <a:p>
+            <a:r>
+              <a:rPr lang="en-US" dirty="0" smtClean="0"/>
+              <a:t>Demographics (DM)</a:t>
+            </a:r>
+          </a:p>
+          <a:p>
+            <a:r>
+              <a:rPr lang="en-US" dirty="0"/>
+              <a:t>Events (AE)</a:t>
+            </a:r>
+          </a:p>
+          <a:p>
+            <a:r>
+              <a:rPr lang="en-US" dirty="0" smtClean="0"/>
+              <a:t>Subject Visits (SV)</a:t>
+            </a:r>
+          </a:p>
+          <a:p>
+            <a:r>
+              <a:rPr lang="en-US" dirty="0" smtClean="0"/>
+              <a:t>Findings (EG, LB, VS)</a:t>
+            </a:r>
+          </a:p>
+          <a:p>
             <a:endParaRPr lang="en-US" dirty="0"/>
           </a:p>
         </p:txBody>
@@ -13822,7 +15836,7 @@
         </p:nvSpPr>
         <p:spPr>
           <a:xfrm>
-            <a:off x="3959530" y="1905000"/>
+            <a:off x="6011189" y="2667000"/>
             <a:ext cx="1301141" cy="707886"/>
           </a:xfrm>
           <a:prstGeom prst="rect">
@@ -13852,13 +15866,13 @@
       </p:sp>
       <p:sp>
         <p:nvSpPr>
-          <p:cNvPr id="6" name="TextBox 5"/>
+          <p:cNvPr id="5" name="TextBox 4"/>
           <p:cNvSpPr txBox="1"/>
           <p:nvPr/>
         </p:nvSpPr>
         <p:spPr>
           <a:xfrm>
-            <a:off x="2667000" y="3254514"/>
+            <a:off x="4718659" y="4016514"/>
             <a:ext cx="1301141" cy="707886"/>
           </a:xfrm>
           <a:prstGeom prst="rect">
@@ -13888,16 +15902,16 @@
       </p:sp>
       <p:cxnSp>
         <p:nvCxnSpPr>
-          <p:cNvPr id="8" name="Straight Arrow Connector 7"/>
+          <p:cNvPr id="6" name="Straight Arrow Connector 5"/>
           <p:cNvCxnSpPr>
             <a:stCxn id="4" idx="2"/>
-            <a:endCxn id="6" idx="0"/>
+            <a:endCxn id="5" idx="0"/>
           </p:cNvCxnSpPr>
           <p:nvPr/>
         </p:nvCxnSpPr>
         <p:spPr>
           <a:xfrm flipH="1">
-            <a:off x="3317571" y="2612886"/>
+            <a:off x="5369230" y="3374886"/>
             <a:ext cx="1292530" cy="641628"/>
           </a:xfrm>
           <a:prstGeom prst="straightConnector1">
@@ -13924,13 +15938,13 @@
       </p:cxnSp>
       <p:sp>
         <p:nvSpPr>
-          <p:cNvPr id="10" name="TextBox 9"/>
+          <p:cNvPr id="7" name="TextBox 6"/>
           <p:cNvSpPr txBox="1"/>
           <p:nvPr/>
         </p:nvSpPr>
         <p:spPr>
           <a:xfrm>
-            <a:off x="5257800" y="3254514"/>
+            <a:off x="7309459" y="4016514"/>
             <a:ext cx="1301141" cy="707886"/>
           </a:xfrm>
           <a:prstGeom prst="rect">
@@ -13960,13 +15974,13 @@
       </p:sp>
       <p:sp>
         <p:nvSpPr>
-          <p:cNvPr id="11" name="TextBox 10"/>
+          <p:cNvPr id="8" name="TextBox 7"/>
           <p:cNvSpPr txBox="1"/>
           <p:nvPr/>
         </p:nvSpPr>
         <p:spPr>
           <a:xfrm>
-            <a:off x="2365070" y="4891754"/>
+            <a:off x="4416729" y="5653754"/>
             <a:ext cx="1905001" cy="747046"/>
           </a:xfrm>
           <a:prstGeom prst="rect">
@@ -13996,7 +16010,7 @@
       </p:sp>
       <p:cxnSp>
         <p:nvCxnSpPr>
-          <p:cNvPr id="12" name="Straight Arrow Connector 11"/>
+          <p:cNvPr id="9" name="Straight Arrow Connector 8"/>
           <p:cNvCxnSpPr>
             <a:stCxn id="4" idx="2"/>
           </p:cNvCxnSpPr>
@@ -14004,7 +16018,7 @@
         </p:nvCxnSpPr>
         <p:spPr>
           <a:xfrm>
-            <a:off x="4610101" y="2612886"/>
+            <a:off x="6661760" y="3374886"/>
             <a:ext cx="1298269" cy="641628"/>
           </a:xfrm>
           <a:prstGeom prst="straightConnector1">
@@ -14031,16 +16045,16 @@
       </p:cxnSp>
       <p:cxnSp>
         <p:nvCxnSpPr>
-          <p:cNvPr id="15" name="Straight Arrow Connector 14"/>
+          <p:cNvPr id="10" name="Straight Arrow Connector 9"/>
           <p:cNvCxnSpPr>
-            <a:stCxn id="6" idx="2"/>
-            <a:endCxn id="11" idx="0"/>
+            <a:stCxn id="5" idx="2"/>
+            <a:endCxn id="8" idx="0"/>
           </p:cNvCxnSpPr>
           <p:nvPr/>
         </p:nvCxnSpPr>
         <p:spPr>
           <a:xfrm>
-            <a:off x="3317571" y="3962400"/>
+            <a:off x="5369230" y="4724400"/>
             <a:ext cx="0" cy="929354"/>
           </a:xfrm>
           <a:prstGeom prst="straightConnector1">
@@ -14068,7 +16082,7 @@
     </p:spTree>
     <p:extLst>
       <p:ext uri="{BB962C8B-B14F-4D97-AF65-F5344CB8AC3E}">
-        <p14:creationId xmlns:p14="http://schemas.microsoft.com/office/powerpoint/2010/main" val="2200547592"/>
+        <p14:creationId xmlns:p14="http://schemas.microsoft.com/office/powerpoint/2010/main" val="786166402"/>
       </p:ext>
     </p:extLst>
   </p:cSld>
@@ -14085,7 +16099,7 @@
 </p:sld>
 </file>
 
-<file path=ppt/slides/slide4.xml><?xml version="1.0" encoding="utf-8"?>
+<file path=ppt/slides/slide6.xml><?xml version="1.0" encoding="utf-8"?>
 <p:sld xmlns:a="http://schemas.openxmlformats.org/drawingml/2006/main" xmlns:r="http://schemas.openxmlformats.org/officeDocument/2006/relationships" xmlns:p="http://schemas.openxmlformats.org/presentationml/2006/main">
   <p:cSld>
     <p:spTree>
@@ -14641,7 +16655,7 @@
                                     </p:set>
                                     <p:animEffect transition="in" filter="fade">
                                       <p:cBhvr>
-                                        <p:cTn id="7" dur="1000"/>
+                                        <p:cTn id="7" dur="500"/>
                                         <p:tgtEl>
                                           <p:spTgt spid="3">
                                             <p:txEl>
@@ -14660,7 +16674,7 @@
                         <p:par>
                           <p:cTn id="8" fill="hold">
                             <p:stCondLst>
-                              <p:cond delay="1000"/>
+                              <p:cond delay="500"/>
                             </p:stCondLst>
                             <p:childTnLst>
                               <p:par>
@@ -14693,7 +16707,7 @@
                                     </p:set>
                                     <p:animEffect transition="in" filter="fade">
                                       <p:cBhvr>
-                                        <p:cTn id="11" dur="1000"/>
+                                        <p:cTn id="11" dur="500"/>
                                         <p:tgtEl>
                                           <p:spTgt spid="3">
                                             <p:txEl>
@@ -14712,7 +16726,7 @@
                         <p:par>
                           <p:cTn id="12" fill="hold">
                             <p:stCondLst>
-                              <p:cond delay="2000"/>
+                              <p:cond delay="1000"/>
                             </p:stCondLst>
                             <p:childTnLst>
                               <p:par>
@@ -14745,7 +16759,7 @@
                                     </p:set>
                                     <p:animEffect transition="in" filter="fade">
                                       <p:cBhvr>
-                                        <p:cTn id="15" dur="1000"/>
+                                        <p:cTn id="15" dur="500"/>
                                         <p:tgtEl>
                                           <p:spTgt spid="3">
                                             <p:txEl>
@@ -14764,7 +16778,7 @@
                         <p:par>
                           <p:cTn id="16" fill="hold">
                             <p:stCondLst>
-                              <p:cond delay="3000"/>
+                              <p:cond delay="1500"/>
                             </p:stCondLst>
                             <p:childTnLst>
                               <p:par>
@@ -14797,7 +16811,7 @@
                                     </p:set>
                                     <p:animEffect transition="in" filter="fade">
                                       <p:cBhvr>
-                                        <p:cTn id="19" dur="1000"/>
+                                        <p:cTn id="19" dur="500"/>
                                         <p:tgtEl>
                                           <p:spTgt spid="3">
                                             <p:txEl>
@@ -14816,7 +16830,7 @@
                         <p:par>
                           <p:cTn id="20" fill="hold">
                             <p:stCondLst>
-                              <p:cond delay="4000"/>
+                              <p:cond delay="2000"/>
                             </p:stCondLst>
                             <p:childTnLst>
                               <p:par>
@@ -14849,7 +16863,7 @@
                                     </p:set>
                                     <p:animEffect transition="in" filter="fade">
                                       <p:cBhvr>
-                                        <p:cTn id="23" dur="1000"/>
+                                        <p:cTn id="23" dur="500"/>
                                         <p:tgtEl>
                                           <p:spTgt spid="3">
                                             <p:txEl>
@@ -14868,7 +16882,7 @@
                         <p:par>
                           <p:cTn id="24" fill="hold">
                             <p:stCondLst>
-                              <p:cond delay="5000"/>
+                              <p:cond delay="2500"/>
                             </p:stCondLst>
                             <p:childTnLst>
                               <p:par>
@@ -14901,7 +16915,7 @@
                                     </p:set>
                                     <p:animEffect transition="in" filter="fade">
                                       <p:cBhvr>
-                                        <p:cTn id="27" dur="1000"/>
+                                        <p:cTn id="27" dur="500"/>
                                         <p:tgtEl>
                                           <p:spTgt spid="3">
                                             <p:txEl>
@@ -14920,7 +16934,7 @@
                         <p:par>
                           <p:cTn id="28" fill="hold">
                             <p:stCondLst>
-                              <p:cond delay="6000"/>
+                              <p:cond delay="3000"/>
                             </p:stCondLst>
                             <p:childTnLst>
                               <p:par>
@@ -14953,7 +16967,7 @@
                                     </p:set>
                                     <p:animEffect transition="in" filter="fade">
                                       <p:cBhvr>
-                                        <p:cTn id="31" dur="1000"/>
+                                        <p:cTn id="31" dur="500"/>
                                         <p:tgtEl>
                                           <p:spTgt spid="3">
                                             <p:txEl>
@@ -14972,7 +16986,7 @@
                         <p:par>
                           <p:cTn id="32" fill="hold">
                             <p:stCondLst>
-                              <p:cond delay="7000"/>
+                              <p:cond delay="3500"/>
                             </p:stCondLst>
                             <p:childTnLst>
                               <p:par>
@@ -15005,7 +17019,7 @@
                                     </p:set>
                                     <p:animEffect transition="in" filter="fade">
                                       <p:cBhvr>
-                                        <p:cTn id="35" dur="1000"/>
+                                        <p:cTn id="35" dur="500"/>
                                         <p:tgtEl>
                                           <p:spTgt spid="3">
                                             <p:txEl>
@@ -15024,7 +17038,7 @@
                         <p:par>
                           <p:cTn id="36" fill="hold">
                             <p:stCondLst>
-                              <p:cond delay="8000"/>
+                              <p:cond delay="4000"/>
                             </p:stCondLst>
                             <p:childTnLst>
                               <p:par>
@@ -15057,7 +17071,7 @@
                                     </p:set>
                                     <p:animEffect transition="in" filter="fade">
                                       <p:cBhvr>
-                                        <p:cTn id="39" dur="1000"/>
+                                        <p:cTn id="39" dur="500"/>
                                         <p:tgtEl>
                                           <p:spTgt spid="3">
                                             <p:txEl>
@@ -15076,7 +17090,7 @@
                         <p:par>
                           <p:cTn id="40" fill="hold">
                             <p:stCondLst>
-                              <p:cond delay="9000"/>
+                              <p:cond delay="4500"/>
                             </p:stCondLst>
                             <p:childTnLst>
                               <p:par>
@@ -15109,7 +17123,7 @@
                                     </p:set>
                                     <p:animEffect transition="in" filter="fade">
                                       <p:cBhvr>
-                                        <p:cTn id="43" dur="1000"/>
+                                        <p:cTn id="43" dur="500"/>
                                         <p:tgtEl>
                                           <p:spTgt spid="3">
                                             <p:txEl>
@@ -15128,7 +17142,7 @@
                         <p:par>
                           <p:cTn id="44" fill="hold">
                             <p:stCondLst>
-                              <p:cond delay="10000"/>
+                              <p:cond delay="5000"/>
                             </p:stCondLst>
                             <p:childTnLst>
                               <p:par>
@@ -15161,7 +17175,7 @@
                                     </p:set>
                                     <p:animEffect transition="in" filter="fade">
                                       <p:cBhvr>
-                                        <p:cTn id="47" dur="1000"/>
+                                        <p:cTn id="47" dur="500"/>
                                         <p:tgtEl>
                                           <p:spTgt spid="3">
                                             <p:txEl>
@@ -15180,7 +17194,7 @@
                         <p:par>
                           <p:cTn id="48" fill="hold">
                             <p:stCondLst>
-                              <p:cond delay="11000"/>
+                              <p:cond delay="5500"/>
                             </p:stCondLst>
                             <p:childTnLst>
                               <p:par>
@@ -15213,7 +17227,7 @@
                                     </p:set>
                                     <p:animEffect transition="in" filter="fade">
                                       <p:cBhvr>
-                                        <p:cTn id="51" dur="1000"/>
+                                        <p:cTn id="51" dur="500"/>
                                         <p:tgtEl>
                                           <p:spTgt spid="3">
                                             <p:txEl>
@@ -15232,7 +17246,7 @@
                         <p:par>
                           <p:cTn id="52" fill="hold">
                             <p:stCondLst>
-                              <p:cond delay="12000"/>
+                              <p:cond delay="6000"/>
                             </p:stCondLst>
                             <p:childTnLst>
                               <p:par>
@@ -15265,7 +17279,7 @@
                                     </p:set>
                                     <p:animEffect transition="in" filter="fade">
                                       <p:cBhvr>
-                                        <p:cTn id="55" dur="1000"/>
+                                        <p:cTn id="55" dur="500"/>
                                         <p:tgtEl>
                                           <p:spTgt spid="3">
                                             <p:txEl>
@@ -15284,7 +17298,7 @@
                         <p:par>
                           <p:cTn id="56" fill="hold">
                             <p:stCondLst>
-                              <p:cond delay="13000"/>
+                              <p:cond delay="6500"/>
                             </p:stCondLst>
                             <p:childTnLst>
                               <p:par>
@@ -15317,7 +17331,7 @@
                                     </p:set>
                                     <p:animEffect transition="in" filter="fade">
                                       <p:cBhvr>
-                                        <p:cTn id="59" dur="1000"/>
+                                        <p:cTn id="59" dur="500"/>
                                         <p:tgtEl>
                                           <p:spTgt spid="3">
                                             <p:txEl>
@@ -15364,7 +17378,7 @@
 </p:sld>
 </file>
 
-<file path=ppt/slides/slide5.xml><?xml version="1.0" encoding="utf-8"?>
+<file path=ppt/slides/slide7.xml><?xml version="1.0" encoding="utf-8"?>
 <p:sld xmlns:a="http://schemas.openxmlformats.org/drawingml/2006/main" xmlns:r="http://schemas.openxmlformats.org/officeDocument/2006/relationships" xmlns:p="http://schemas.openxmlformats.org/presentationml/2006/main">
   <p:cSld>
     <p:spTree>
@@ -15763,7 +17777,7 @@
 </p:sld>
 </file>
 
-<file path=ppt/slides/slide6.xml><?xml version="1.0" encoding="utf-8"?>
+<file path=ppt/slides/slide8.xml><?xml version="1.0" encoding="utf-8"?>
 <p:sld xmlns:a="http://schemas.openxmlformats.org/drawingml/2006/main" xmlns:r="http://schemas.openxmlformats.org/officeDocument/2006/relationships" xmlns:p="http://schemas.openxmlformats.org/presentationml/2006/main">
   <p:cSld>
     <p:spTree>
@@ -16014,10 +18028,6 @@
               </a:rPr>
               <a:t>…</a:t>
             </a:r>
-            <a:endParaRPr lang="en-US" sz="2000" dirty="0" smtClean="0">
-              <a:latin typeface="Courier New" panose="02070309020205020404" pitchFamily="49" charset="0"/>
-              <a:cs typeface="Courier New" panose="02070309020205020404" pitchFamily="49" charset="0"/>
-            </a:endParaRPr>
           </a:p>
           <a:p>
             <a:pPr lvl="1"/>
@@ -16085,6 +18095,134 @@
           </a:extLst>
         </p:spPr>
       </p:pic>
+      <p:sp>
+        <p:nvSpPr>
+          <p:cNvPr id="4" name="Rounded Rectangle 3"/>
+          <p:cNvSpPr/>
+          <p:nvPr/>
+        </p:nvSpPr>
+        <p:spPr>
+          <a:xfrm>
+            <a:off x="838200" y="2657475"/>
+            <a:ext cx="4419600" cy="685800"/>
+          </a:xfrm>
+          <a:prstGeom prst="roundRect">
+            <a:avLst/>
+          </a:prstGeom>
+          <a:noFill/>
+          <a:ln>
+            <a:solidFill>
+              <a:srgbClr val="00B050"/>
+            </a:solidFill>
+          </a:ln>
+        </p:spPr>
+        <p:style>
+          <a:lnRef idx="2">
+            <a:schemeClr val="accent1">
+              <a:shade val="50000"/>
+            </a:schemeClr>
+          </a:lnRef>
+          <a:fillRef idx="1">
+            <a:schemeClr val="accent1"/>
+          </a:fillRef>
+          <a:effectRef idx="0">
+            <a:schemeClr val="accent1"/>
+          </a:effectRef>
+          <a:fontRef idx="minor">
+            <a:schemeClr val="lt1"/>
+          </a:fontRef>
+        </p:style>
+        <p:txBody>
+          <a:bodyPr rtlCol="0" anchor="ctr"/>
+          <a:lstStyle/>
+          <a:p>
+            <a:pPr algn="ctr"/>
+            <a:endParaRPr lang="en-US"/>
+          </a:p>
+        </p:txBody>
+      </p:sp>
+      <p:sp>
+        <p:nvSpPr>
+          <p:cNvPr id="6" name="Rounded Rectangle 5"/>
+          <p:cNvSpPr/>
+          <p:nvPr/>
+        </p:nvSpPr>
+        <p:spPr>
+          <a:xfrm>
+            <a:off x="838200" y="1914525"/>
+            <a:ext cx="2267954" cy="685800"/>
+          </a:xfrm>
+          <a:prstGeom prst="roundRect">
+            <a:avLst/>
+          </a:prstGeom>
+          <a:noFill/>
+        </p:spPr>
+        <p:style>
+          <a:lnRef idx="2">
+            <a:schemeClr val="accent1">
+              <a:shade val="50000"/>
+            </a:schemeClr>
+          </a:lnRef>
+          <a:fillRef idx="1">
+            <a:schemeClr val="accent1"/>
+          </a:fillRef>
+          <a:effectRef idx="0">
+            <a:schemeClr val="accent1"/>
+          </a:effectRef>
+          <a:fontRef idx="minor">
+            <a:schemeClr val="lt1"/>
+          </a:fontRef>
+        </p:style>
+        <p:txBody>
+          <a:bodyPr rtlCol="0" anchor="ctr"/>
+          <a:lstStyle/>
+          <a:p>
+            <a:pPr algn="ctr"/>
+            <a:endParaRPr lang="en-US"/>
+          </a:p>
+        </p:txBody>
+      </p:sp>
+      <p:sp>
+        <p:nvSpPr>
+          <p:cNvPr id="7" name="Rounded Rectangle 6"/>
+          <p:cNvSpPr/>
+          <p:nvPr/>
+        </p:nvSpPr>
+        <p:spPr>
+          <a:xfrm>
+            <a:off x="5105851" y="4901806"/>
+            <a:ext cx="874395" cy="1778789"/>
+          </a:xfrm>
+          <a:prstGeom prst="roundRect">
+            <a:avLst/>
+          </a:prstGeom>
+          <a:noFill/>
+        </p:spPr>
+        <p:style>
+          <a:lnRef idx="2">
+            <a:schemeClr val="accent1">
+              <a:shade val="50000"/>
+            </a:schemeClr>
+          </a:lnRef>
+          <a:fillRef idx="1">
+            <a:schemeClr val="accent1"/>
+          </a:fillRef>
+          <a:effectRef idx="0">
+            <a:schemeClr val="accent1"/>
+          </a:effectRef>
+          <a:fontRef idx="minor">
+            <a:schemeClr val="lt1"/>
+          </a:fontRef>
+        </p:style>
+        <p:txBody>
+          <a:bodyPr rtlCol="0" anchor="ctr"/>
+          <a:lstStyle/>
+          <a:p>
+            <a:pPr algn="ctr"/>
+            <a:endParaRPr lang="en-US"/>
+          </a:p>
+        </p:txBody>
+      </p:sp>
     </p:spTree>
     <p:extLst>
       <p:ext uri="{BB962C8B-B14F-4D97-AF65-F5344CB8AC3E}">
@@ -16098,14 +18236,183 @@
   <p:timing>
     <p:tnLst>
       <p:par>
-        <p:cTn id="1" dur="indefinite" restart="never" nodeType="tmRoot"/>
+        <p:cTn id="1" dur="indefinite" restart="never" nodeType="tmRoot">
+          <p:childTnLst>
+            <p:seq concurrent="1" nextAc="seek">
+              <p:cTn id="2" dur="indefinite" nodeType="mainSeq">
+                <p:childTnLst>
+                  <p:par>
+                    <p:cTn id="3" fill="hold">
+                      <p:stCondLst>
+                        <p:cond delay="indefinite"/>
+                      </p:stCondLst>
+                      <p:childTnLst>
+                        <p:par>
+                          <p:cTn id="4" fill="hold">
+                            <p:stCondLst>
+                              <p:cond delay="0"/>
+                            </p:stCondLst>
+                            <p:childTnLst>
+                              <p:par>
+                                <p:cTn id="5" presetID="10" presetClass="entr" presetSubtype="0" fill="hold" grpId="0" nodeType="clickEffect">
+                                  <p:stCondLst>
+                                    <p:cond delay="0"/>
+                                  </p:stCondLst>
+                                  <p:childTnLst>
+                                    <p:set>
+                                      <p:cBhvr>
+                                        <p:cTn id="6" dur="1" fill="hold">
+                                          <p:stCondLst>
+                                            <p:cond delay="0"/>
+                                          </p:stCondLst>
+                                        </p:cTn>
+                                        <p:tgtEl>
+                                          <p:spTgt spid="6"/>
+                                        </p:tgtEl>
+                                        <p:attrNameLst>
+                                          <p:attrName>style.visibility</p:attrName>
+                                        </p:attrNameLst>
+                                      </p:cBhvr>
+                                      <p:to>
+                                        <p:strVal val="visible"/>
+                                      </p:to>
+                                    </p:set>
+                                    <p:animEffect transition="in" filter="fade">
+                                      <p:cBhvr>
+                                        <p:cTn id="7" dur="500"/>
+                                        <p:tgtEl>
+                                          <p:spTgt spid="6"/>
+                                        </p:tgtEl>
+                                      </p:cBhvr>
+                                    </p:animEffect>
+                                  </p:childTnLst>
+                                </p:cTn>
+                              </p:par>
+                              <p:par>
+                                <p:cTn id="8" presetID="10" presetClass="entr" presetSubtype="0" fill="hold" grpId="0" nodeType="withEffect">
+                                  <p:stCondLst>
+                                    <p:cond delay="0"/>
+                                  </p:stCondLst>
+                                  <p:childTnLst>
+                                    <p:set>
+                                      <p:cBhvr>
+                                        <p:cTn id="9" dur="1" fill="hold">
+                                          <p:stCondLst>
+                                            <p:cond delay="0"/>
+                                          </p:stCondLst>
+                                        </p:cTn>
+                                        <p:tgtEl>
+                                          <p:spTgt spid="7"/>
+                                        </p:tgtEl>
+                                        <p:attrNameLst>
+                                          <p:attrName>style.visibility</p:attrName>
+                                        </p:attrNameLst>
+                                      </p:cBhvr>
+                                      <p:to>
+                                        <p:strVal val="visible"/>
+                                      </p:to>
+                                    </p:set>
+                                    <p:animEffect transition="in" filter="fade">
+                                      <p:cBhvr>
+                                        <p:cTn id="10" dur="500"/>
+                                        <p:tgtEl>
+                                          <p:spTgt spid="7"/>
+                                        </p:tgtEl>
+                                      </p:cBhvr>
+                                    </p:animEffect>
+                                  </p:childTnLst>
+                                </p:cTn>
+                              </p:par>
+                            </p:childTnLst>
+                          </p:cTn>
+                        </p:par>
+                      </p:childTnLst>
+                    </p:cTn>
+                  </p:par>
+                  <p:par>
+                    <p:cTn id="11" fill="hold">
+                      <p:stCondLst>
+                        <p:cond delay="indefinite"/>
+                      </p:stCondLst>
+                      <p:childTnLst>
+                        <p:par>
+                          <p:cTn id="12" fill="hold">
+                            <p:stCondLst>
+                              <p:cond delay="0"/>
+                            </p:stCondLst>
+                            <p:childTnLst>
+                              <p:par>
+                                <p:cTn id="13" presetID="10" presetClass="entr" presetSubtype="0" fill="hold" grpId="0" nodeType="clickEffect">
+                                  <p:stCondLst>
+                                    <p:cond delay="0"/>
+                                  </p:stCondLst>
+                                  <p:childTnLst>
+                                    <p:set>
+                                      <p:cBhvr>
+                                        <p:cTn id="14" dur="1" fill="hold">
+                                          <p:stCondLst>
+                                            <p:cond delay="0"/>
+                                          </p:stCondLst>
+                                        </p:cTn>
+                                        <p:tgtEl>
+                                          <p:spTgt spid="4"/>
+                                        </p:tgtEl>
+                                        <p:attrNameLst>
+                                          <p:attrName>style.visibility</p:attrName>
+                                        </p:attrNameLst>
+                                      </p:cBhvr>
+                                      <p:to>
+                                        <p:strVal val="visible"/>
+                                      </p:to>
+                                    </p:set>
+                                    <p:animEffect transition="in" filter="fade">
+                                      <p:cBhvr>
+                                        <p:cTn id="15" dur="500"/>
+                                        <p:tgtEl>
+                                          <p:spTgt spid="4"/>
+                                        </p:tgtEl>
+                                      </p:cBhvr>
+                                    </p:animEffect>
+                                  </p:childTnLst>
+                                </p:cTn>
+                              </p:par>
+                            </p:childTnLst>
+                          </p:cTn>
+                        </p:par>
+                      </p:childTnLst>
+                    </p:cTn>
+                  </p:par>
+                </p:childTnLst>
+              </p:cTn>
+              <p:prevCondLst>
+                <p:cond evt="onPrev" delay="0">
+                  <p:tgtEl>
+                    <p:sldTgt/>
+                  </p:tgtEl>
+                </p:cond>
+              </p:prevCondLst>
+              <p:nextCondLst>
+                <p:cond evt="onNext" delay="0">
+                  <p:tgtEl>
+                    <p:sldTgt/>
+                  </p:tgtEl>
+                </p:cond>
+              </p:nextCondLst>
+            </p:seq>
+          </p:childTnLst>
+        </p:cTn>
       </p:par>
     </p:tnLst>
+    <p:bldLst>
+      <p:bldP spid="4" grpId="0" animBg="1"/>
+      <p:bldP spid="6" grpId="0" animBg="1"/>
+      <p:bldP spid="7" grpId="0" animBg="1"/>
+    </p:bldLst>
   </p:timing>
 </p:sld>
 </file>
 
-<file path=ppt/slides/slide7.xml><?xml version="1.0" encoding="utf-8"?>
+<file path=ppt/slides/slide9.xml><?xml version="1.0" encoding="utf-8"?>
 <p:sld xmlns:a="http://schemas.openxmlformats.org/drawingml/2006/main" xmlns:r="http://schemas.openxmlformats.org/officeDocument/2006/relationships" xmlns:p="http://schemas.openxmlformats.org/presentationml/2006/main">
   <p:cSld>
     <p:spTree>
@@ -16274,621 +18581,6 @@
           <a:ln>
             <a:solidFill>
               <a:srgbClr val="92D050"/>
-            </a:solidFill>
-          </a:ln>
-        </p:spPr>
-        <p:style>
-          <a:lnRef idx="2">
-            <a:schemeClr val="accent1">
-              <a:shade val="50000"/>
-            </a:schemeClr>
-          </a:lnRef>
-          <a:fillRef idx="1">
-            <a:schemeClr val="accent1"/>
-          </a:fillRef>
-          <a:effectRef idx="0">
-            <a:schemeClr val="accent1"/>
-          </a:effectRef>
-          <a:fontRef idx="minor">
-            <a:schemeClr val="lt1"/>
-          </a:fontRef>
-        </p:style>
-        <p:txBody>
-          <a:bodyPr rtlCol="0" anchor="ctr"/>
-          <a:lstStyle/>
-          <a:p>
-            <a:pPr algn="ctr"/>
-            <a:endParaRPr lang="en-US"/>
-          </a:p>
-        </p:txBody>
-      </p:sp>
-    </p:spTree>
-    <p:extLst>
-      <p:ext uri="{BB962C8B-B14F-4D97-AF65-F5344CB8AC3E}">
-        <p14:creationId xmlns:p14="http://schemas.microsoft.com/office/powerpoint/2010/main" val="1927350821"/>
-      </p:ext>
-    </p:extLst>
-  </p:cSld>
-  <p:clrMapOvr>
-    <a:masterClrMapping/>
-  </p:clrMapOvr>
-  <p:timing>
-    <p:tnLst>
-      <p:par>
-        <p:cTn id="1" dur="indefinite" restart="never" nodeType="tmRoot"/>
-      </p:par>
-    </p:tnLst>
-  </p:timing>
-</p:sld>
-</file>
-
-<file path=ppt/slides/slide8.xml><?xml version="1.0" encoding="utf-8"?>
-<p:sld xmlns:a="http://schemas.openxmlformats.org/drawingml/2006/main" xmlns:r="http://schemas.openxmlformats.org/officeDocument/2006/relationships" xmlns:p="http://schemas.openxmlformats.org/presentationml/2006/main">
-  <p:cSld>
-    <p:spTree>
-      <p:nvGrpSpPr>
-        <p:cNvPr id="1" name=""/>
-        <p:cNvGrpSpPr/>
-        <p:nvPr/>
-      </p:nvGrpSpPr>
-      <p:grpSpPr>
-        <a:xfrm>
-          <a:off x="0" y="0"/>
-          <a:ext cx="0" cy="0"/>
-          <a:chOff x="0" y="0"/>
-          <a:chExt cx="0" cy="0"/>
-        </a:xfrm>
-      </p:grpSpPr>
-      <p:sp>
-        <p:nvSpPr>
-          <p:cNvPr id="2" name="Title 1"/>
-          <p:cNvSpPr>
-            <a:spLocks noGrp="1"/>
-          </p:cNvSpPr>
-          <p:nvPr>
-            <p:ph type="title"/>
-          </p:nvPr>
-        </p:nvSpPr>
-        <p:spPr>
-          <a:xfrm>
-            <a:off x="457200" y="0"/>
-            <a:ext cx="8229600" cy="1143000"/>
-          </a:xfrm>
-        </p:spPr>
-        <p:txBody>
-          <a:bodyPr/>
-          <a:lstStyle/>
-          <a:p>
-            <a:r>
-              <a:rPr lang="en-US" dirty="0" smtClean="0"/>
-              <a:t>Program Flow: DM</a:t>
-            </a:r>
-            <a:endParaRPr lang="en-US" dirty="0"/>
-          </a:p>
-        </p:txBody>
-      </p:sp>
-      <p:sp>
-        <p:nvSpPr>
-          <p:cNvPr id="3" name="Content Placeholder 2"/>
-          <p:cNvSpPr>
-            <a:spLocks noGrp="1"/>
-          </p:cNvSpPr>
-          <p:nvPr>
-            <p:ph idx="1"/>
-          </p:nvPr>
-        </p:nvSpPr>
-        <p:spPr>
-          <a:xfrm>
-            <a:off x="457200" y="1143000"/>
-            <a:ext cx="8229600" cy="5029200"/>
-          </a:xfrm>
-        </p:spPr>
-        <p:txBody>
-          <a:bodyPr>
-            <a:normAutofit/>
-          </a:bodyPr>
-          <a:lstStyle/>
-          <a:p>
-            <a:pPr marL="0" indent="0">
-              <a:lnSpc>
-                <a:spcPts val="2400"/>
-              </a:lnSpc>
-              <a:buNone/>
-            </a:pPr>
-            <a:r>
-              <a:rPr lang="en-US" sz="2200" dirty="0" smtClean="0">
-                <a:latin typeface="Courier New" panose="02070309020205020404" pitchFamily="49" charset="0"/>
-                <a:cs typeface="Courier New" panose="02070309020205020404" pitchFamily="49" charset="0"/>
-              </a:rPr>
-              <a:t>%</a:t>
-            </a:r>
-            <a:r>
-              <a:rPr lang="en-US" sz="2200" dirty="0" err="1" smtClean="0">
-                <a:latin typeface="Courier New" panose="02070309020205020404" pitchFamily="49" charset="0"/>
-                <a:cs typeface="Courier New" panose="02070309020205020404" pitchFamily="49" charset="0"/>
-              </a:rPr>
-              <a:t>dm_create</a:t>
-            </a:r>
-            <a:endParaRPr lang="en-US" sz="2200" dirty="0" smtClean="0">
-              <a:latin typeface="Courier New" panose="02070309020205020404" pitchFamily="49" charset="0"/>
-              <a:cs typeface="Courier New" panose="02070309020205020404" pitchFamily="49" charset="0"/>
-            </a:endParaRPr>
-          </a:p>
-          <a:p>
-            <a:pPr marL="0" indent="0">
-              <a:lnSpc>
-                <a:spcPts val="2400"/>
-              </a:lnSpc>
-              <a:buNone/>
-            </a:pPr>
-            <a:r>
-              <a:rPr lang="en-US" sz="2200" dirty="0" smtClean="0">
-                <a:latin typeface="Courier New" panose="02070309020205020404" pitchFamily="49" charset="0"/>
-                <a:cs typeface="Courier New" panose="02070309020205020404" pitchFamily="49" charset="0"/>
-              </a:rPr>
-              <a:t>   </a:t>
-            </a:r>
-            <a:r>
-              <a:rPr lang="en-US" sz="2200" dirty="0" smtClean="0">
-                <a:latin typeface="Courier New" panose="02070309020205020404" pitchFamily="49" charset="0"/>
-                <a:cs typeface="Courier New" panose="02070309020205020404" pitchFamily="49" charset="0"/>
-              </a:rPr>
-              <a:t>(…</a:t>
-            </a:r>
-            <a:endParaRPr lang="en-US" sz="2200" dirty="0">
-              <a:latin typeface="Courier New" panose="02070309020205020404" pitchFamily="49" charset="0"/>
-              <a:cs typeface="Courier New" panose="02070309020205020404" pitchFamily="49" charset="0"/>
-            </a:endParaRPr>
-          </a:p>
-          <a:p>
-            <a:pPr marL="0" indent="0">
-              <a:lnSpc>
-                <a:spcPts val="2400"/>
-              </a:lnSpc>
-              <a:buNone/>
-            </a:pPr>
-            <a:r>
-              <a:rPr lang="en-US" sz="2200" dirty="0">
-                <a:latin typeface="Courier New" panose="02070309020205020404" pitchFamily="49" charset="0"/>
-                <a:cs typeface="Courier New" panose="02070309020205020404" pitchFamily="49" charset="0"/>
-              </a:rPr>
-              <a:t>   ,</a:t>
-            </a:r>
-            <a:r>
-              <a:rPr lang="en-US" sz="2200" dirty="0" err="1" smtClean="0">
-                <a:latin typeface="Courier New" panose="02070309020205020404" pitchFamily="49" charset="0"/>
-                <a:cs typeface="Courier New" panose="02070309020205020404" pitchFamily="49" charset="0"/>
-              </a:rPr>
-              <a:t>fpfvdt</a:t>
-            </a:r>
-            <a:r>
-              <a:rPr lang="en-US" sz="2200" dirty="0" smtClean="0">
-                <a:latin typeface="Courier New" panose="02070309020205020404" pitchFamily="49" charset="0"/>
-                <a:cs typeface="Courier New" panose="02070309020205020404" pitchFamily="49" charset="0"/>
-              </a:rPr>
-              <a:t>=01oct2016</a:t>
-            </a:r>
-          </a:p>
-          <a:p>
-            <a:pPr marL="0" indent="0">
-              <a:lnSpc>
-                <a:spcPts val="2400"/>
-              </a:lnSpc>
-              <a:buNone/>
-            </a:pPr>
-            <a:r>
-              <a:rPr lang="en-US" sz="2200" dirty="0">
-                <a:latin typeface="Courier New" panose="02070309020205020404" pitchFamily="49" charset="0"/>
-                <a:cs typeface="Courier New" panose="02070309020205020404" pitchFamily="49" charset="0"/>
-              </a:rPr>
-              <a:t> </a:t>
-            </a:r>
-            <a:r>
-              <a:rPr lang="en-US" sz="2200" dirty="0" smtClean="0">
-                <a:latin typeface="Courier New" panose="02070309020205020404" pitchFamily="49" charset="0"/>
-                <a:cs typeface="Courier New" panose="02070309020205020404" pitchFamily="49" charset="0"/>
-              </a:rPr>
-              <a:t>  </a:t>
-            </a:r>
-            <a:r>
-              <a:rPr lang="en-US" sz="2200" dirty="0" smtClean="0">
-                <a:latin typeface="Courier New" panose="02070309020205020404" pitchFamily="49" charset="0"/>
-                <a:cs typeface="Courier New" panose="02070309020205020404" pitchFamily="49" charset="0"/>
-              </a:rPr>
-              <a:t>,</a:t>
-            </a:r>
-            <a:r>
-              <a:rPr lang="en-US" sz="2200" dirty="0" err="1" smtClean="0">
-                <a:latin typeface="Courier New" panose="02070309020205020404" pitchFamily="49" charset="0"/>
-                <a:cs typeface="Courier New" panose="02070309020205020404" pitchFamily="49" charset="0"/>
-              </a:rPr>
-              <a:t>lpfvdt</a:t>
-            </a:r>
-            <a:r>
-              <a:rPr lang="en-US" sz="2200" dirty="0" smtClean="0">
-                <a:latin typeface="Courier New" panose="02070309020205020404" pitchFamily="49" charset="0"/>
-                <a:cs typeface="Courier New" panose="02070309020205020404" pitchFamily="49" charset="0"/>
-              </a:rPr>
-              <a:t>=01apr2017</a:t>
-            </a:r>
-            <a:endParaRPr lang="en-US" sz="2200" dirty="0">
-              <a:latin typeface="Courier New" panose="02070309020205020404" pitchFamily="49" charset="0"/>
-              <a:cs typeface="Courier New" panose="02070309020205020404" pitchFamily="49" charset="0"/>
-            </a:endParaRPr>
-          </a:p>
-          <a:p>
-            <a:pPr marL="0" indent="0">
-              <a:lnSpc>
-                <a:spcPts val="2400"/>
-              </a:lnSpc>
-              <a:buNone/>
-            </a:pPr>
-            <a:r>
-              <a:rPr lang="en-US" sz="2200" dirty="0">
-                <a:latin typeface="Courier New" panose="02070309020205020404" pitchFamily="49" charset="0"/>
-                <a:cs typeface="Courier New" panose="02070309020205020404" pitchFamily="49" charset="0"/>
-              </a:rPr>
-              <a:t>   ,</a:t>
-            </a:r>
-            <a:r>
-              <a:rPr lang="en-US" sz="2200" dirty="0" err="1" smtClean="0">
-                <a:latin typeface="Courier New" panose="02070309020205020404" pitchFamily="49" charset="0"/>
-                <a:cs typeface="Courier New" panose="02070309020205020404" pitchFamily="49" charset="0"/>
-              </a:rPr>
-              <a:t>screendur</a:t>
-            </a:r>
-            <a:r>
-              <a:rPr lang="en-US" sz="2200" dirty="0" smtClean="0">
-                <a:latin typeface="Courier New" panose="02070309020205020404" pitchFamily="49" charset="0"/>
-                <a:cs typeface="Courier New" panose="02070309020205020404" pitchFamily="49" charset="0"/>
-              </a:rPr>
-              <a:t>=3</a:t>
-            </a:r>
-          </a:p>
-          <a:p>
-            <a:pPr marL="0" indent="0">
-              <a:lnSpc>
-                <a:spcPts val="2400"/>
-              </a:lnSpc>
-              <a:buNone/>
-            </a:pPr>
-            <a:r>
-              <a:rPr lang="en-US" sz="2200" dirty="0">
-                <a:latin typeface="Courier New" panose="02070309020205020404" pitchFamily="49" charset="0"/>
-                <a:cs typeface="Courier New" panose="02070309020205020404" pitchFamily="49" charset="0"/>
-              </a:rPr>
-              <a:t> </a:t>
-            </a:r>
-            <a:r>
-              <a:rPr lang="en-US" sz="2200" dirty="0" smtClean="0">
-                <a:latin typeface="Courier New" panose="02070309020205020404" pitchFamily="49" charset="0"/>
-                <a:cs typeface="Courier New" panose="02070309020205020404" pitchFamily="49" charset="0"/>
-              </a:rPr>
-              <a:t>  </a:t>
-            </a:r>
-            <a:r>
-              <a:rPr lang="en-US" sz="2200" dirty="0" smtClean="0">
-                <a:latin typeface="Courier New" panose="02070309020205020404" pitchFamily="49" charset="0"/>
-                <a:cs typeface="Courier New" panose="02070309020205020404" pitchFamily="49" charset="0"/>
-              </a:rPr>
-              <a:t>,</a:t>
-            </a:r>
-            <a:r>
-              <a:rPr lang="en-US" sz="2200" dirty="0" err="1" smtClean="0">
-                <a:latin typeface="Courier New" panose="02070309020205020404" pitchFamily="49" charset="0"/>
-                <a:cs typeface="Courier New" panose="02070309020205020404" pitchFamily="49" charset="0"/>
-              </a:rPr>
-              <a:t>treatdur</a:t>
-            </a:r>
-            <a:r>
-              <a:rPr lang="en-US" sz="2200" dirty="0" smtClean="0">
-                <a:latin typeface="Courier New" panose="02070309020205020404" pitchFamily="49" charset="0"/>
-                <a:cs typeface="Courier New" panose="02070309020205020404" pitchFamily="49" charset="0"/>
-              </a:rPr>
-              <a:t>=182</a:t>
-            </a:r>
-          </a:p>
-          <a:p>
-            <a:pPr marL="0" indent="0">
-              <a:lnSpc>
-                <a:spcPts val="2400"/>
-              </a:lnSpc>
-              <a:buNone/>
-            </a:pPr>
-            <a:r>
-              <a:rPr lang="en-US" sz="2200" dirty="0">
-                <a:latin typeface="Courier New" panose="02070309020205020404" pitchFamily="49" charset="0"/>
-                <a:cs typeface="Courier New" panose="02070309020205020404" pitchFamily="49" charset="0"/>
-              </a:rPr>
-              <a:t> </a:t>
-            </a:r>
-            <a:r>
-              <a:rPr lang="en-US" sz="2200" dirty="0" smtClean="0">
-                <a:latin typeface="Courier New" panose="02070309020205020404" pitchFamily="49" charset="0"/>
-                <a:cs typeface="Courier New" panose="02070309020205020404" pitchFamily="49" charset="0"/>
-              </a:rPr>
-              <a:t>  </a:t>
-            </a:r>
-            <a:r>
-              <a:rPr lang="en-US" sz="2200" dirty="0" smtClean="0">
-                <a:latin typeface="Courier New" panose="02070309020205020404" pitchFamily="49" charset="0"/>
-                <a:cs typeface="Courier New" panose="02070309020205020404" pitchFamily="49" charset="0"/>
-              </a:rPr>
-              <a:t>,</a:t>
-            </a:r>
-            <a:r>
-              <a:rPr lang="en-US" sz="2200" dirty="0" err="1" smtClean="0">
-                <a:latin typeface="Courier New" panose="02070309020205020404" pitchFamily="49" charset="0"/>
-                <a:cs typeface="Courier New" panose="02070309020205020404" pitchFamily="49" charset="0"/>
-              </a:rPr>
-              <a:t>followupdur</a:t>
-            </a:r>
-            <a:r>
-              <a:rPr lang="en-US" sz="2200" dirty="0" smtClean="0">
-                <a:latin typeface="Courier New" panose="02070309020205020404" pitchFamily="49" charset="0"/>
-                <a:cs typeface="Courier New" panose="02070309020205020404" pitchFamily="49" charset="0"/>
-              </a:rPr>
-              <a:t>=28</a:t>
-            </a:r>
-            <a:endParaRPr lang="en-US" sz="2200" dirty="0">
-              <a:latin typeface="Courier New" panose="02070309020205020404" pitchFamily="49" charset="0"/>
-              <a:cs typeface="Courier New" panose="02070309020205020404" pitchFamily="49" charset="0"/>
-            </a:endParaRPr>
-          </a:p>
-          <a:p>
-            <a:pPr marL="0" indent="0">
-              <a:lnSpc>
-                <a:spcPts val="2400"/>
-              </a:lnSpc>
-              <a:buNone/>
-            </a:pPr>
-            <a:r>
-              <a:rPr lang="en-US" sz="2200" dirty="0">
-                <a:latin typeface="Courier New" panose="02070309020205020404" pitchFamily="49" charset="0"/>
-                <a:cs typeface="Courier New" panose="02070309020205020404" pitchFamily="49" charset="0"/>
-              </a:rPr>
-              <a:t>   ,</a:t>
-            </a:r>
-            <a:r>
-              <a:rPr lang="en-US" sz="2200" dirty="0" err="1">
-                <a:latin typeface="Courier New" panose="02070309020205020404" pitchFamily="49" charset="0"/>
-                <a:cs typeface="Courier New" panose="02070309020205020404" pitchFamily="49" charset="0"/>
-              </a:rPr>
-              <a:t>deathprob</a:t>
-            </a:r>
-            <a:r>
-              <a:rPr lang="en-US" sz="2200" dirty="0">
-                <a:latin typeface="Courier New" panose="02070309020205020404" pitchFamily="49" charset="0"/>
-                <a:cs typeface="Courier New" panose="02070309020205020404" pitchFamily="49" charset="0"/>
-              </a:rPr>
-              <a:t>=0.05</a:t>
-            </a:r>
-          </a:p>
-          <a:p>
-            <a:pPr marL="0" indent="0">
-              <a:lnSpc>
-                <a:spcPts val="2400"/>
-              </a:lnSpc>
-              <a:buNone/>
-            </a:pPr>
-            <a:r>
-              <a:rPr lang="en-US" sz="2200" dirty="0">
-                <a:latin typeface="Courier New" panose="02070309020205020404" pitchFamily="49" charset="0"/>
-                <a:cs typeface="Courier New" panose="02070309020205020404" pitchFamily="49" charset="0"/>
-              </a:rPr>
-              <a:t>   </a:t>
-            </a:r>
-            <a:r>
-              <a:rPr lang="en-US" sz="2200" dirty="0" smtClean="0">
-                <a:latin typeface="Courier New" panose="02070309020205020404" pitchFamily="49" charset="0"/>
-                <a:cs typeface="Courier New" panose="02070309020205020404" pitchFamily="49" charset="0"/>
-              </a:rPr>
-              <a:t>…</a:t>
-            </a:r>
-            <a:endParaRPr lang="en-US" sz="2200" dirty="0" smtClean="0">
-              <a:latin typeface="Courier New" panose="02070309020205020404" pitchFamily="49" charset="0"/>
-              <a:cs typeface="Courier New" panose="02070309020205020404" pitchFamily="49" charset="0"/>
-            </a:endParaRPr>
-          </a:p>
-          <a:p>
-            <a:pPr lvl="1"/>
-            <a:r>
-              <a:rPr lang="en-US" dirty="0" smtClean="0"/>
-              <a:t>Start date, end date, date of birth, etc.</a:t>
-            </a:r>
-          </a:p>
-        </p:txBody>
-      </p:sp>
-      <p:pic>
-        <p:nvPicPr>
-          <p:cNvPr id="3075" name="Picture 3"/>
-          <p:cNvPicPr>
-            <a:picLocks noChangeAspect="1" noChangeArrowheads="1"/>
-          </p:cNvPicPr>
-          <p:nvPr/>
-        </p:nvPicPr>
-        <p:blipFill rotWithShape="1">
-          <a:blip r:embed="rId2">
-            <a:extLst>
-              <a:ext uri="{28A0092B-C50C-407E-A947-70E740481C1C}">
-                <a14:useLocalDpi xmlns:a14="http://schemas.microsoft.com/office/drawing/2010/main" val="0"/>
-              </a:ext>
-            </a:extLst>
-          </a:blip>
-          <a:srcRect b="46771"/>
-          <a:stretch/>
-        </p:blipFill>
-        <p:spPr bwMode="auto">
-          <a:xfrm>
-            <a:off x="1488996" y="5088581"/>
-            <a:ext cx="6166009" cy="1693219"/>
-          </a:xfrm>
-          <a:prstGeom prst="rect">
-            <a:avLst/>
-          </a:prstGeom>
-          <a:noFill/>
-          <a:ln w="9525">
-            <a:solidFill>
-              <a:schemeClr val="tx1"/>
-            </a:solidFill>
-            <a:miter lim="800000"/>
-            <a:headEnd/>
-            <a:tailEnd/>
-          </a:ln>
-          <a:extLst>
-            <a:ext uri="{909E8E84-426E-40DD-AFC4-6F175D3DCCD1}">
-              <a14:hiddenFill xmlns:a14="http://schemas.microsoft.com/office/drawing/2010/main">
-                <a:solidFill>
-                  <a:schemeClr val="accent1"/>
-                </a:solidFill>
-              </a14:hiddenFill>
-            </a:ext>
-          </a:extLst>
-        </p:spPr>
-      </p:pic>
-    </p:spTree>
-    <p:extLst>
-      <p:ext uri="{BB962C8B-B14F-4D97-AF65-F5344CB8AC3E}">
-        <p14:creationId xmlns:p14="http://schemas.microsoft.com/office/powerpoint/2010/main" val="2428527846"/>
-      </p:ext>
-    </p:extLst>
-  </p:cSld>
-  <p:clrMapOvr>
-    <a:masterClrMapping/>
-  </p:clrMapOvr>
-  <p:timing>
-    <p:tnLst>
-      <p:par>
-        <p:cTn id="1" dur="indefinite" restart="never" nodeType="tmRoot"/>
-      </p:par>
-    </p:tnLst>
-  </p:timing>
-</p:sld>
-</file>
-
-<file path=ppt/slides/slide9.xml><?xml version="1.0" encoding="utf-8"?>
-<p:sld xmlns:a="http://schemas.openxmlformats.org/drawingml/2006/main" xmlns:r="http://schemas.openxmlformats.org/officeDocument/2006/relationships" xmlns:p="http://schemas.openxmlformats.org/presentationml/2006/main">
-  <p:cSld>
-    <p:spTree>
-      <p:nvGrpSpPr>
-        <p:cNvPr id="1" name=""/>
-        <p:cNvGrpSpPr/>
-        <p:nvPr/>
-      </p:nvGrpSpPr>
-      <p:grpSpPr>
-        <a:xfrm>
-          <a:off x="0" y="0"/>
-          <a:ext cx="0" cy="0"/>
-          <a:chOff x="0" y="0"/>
-          <a:chExt cx="0" cy="0"/>
-        </a:xfrm>
-      </p:grpSpPr>
-      <p:sp>
-        <p:nvSpPr>
-          <p:cNvPr id="2" name="Title 1"/>
-          <p:cNvSpPr>
-            <a:spLocks noGrp="1"/>
-          </p:cNvSpPr>
-          <p:nvPr>
-            <p:ph type="title"/>
-          </p:nvPr>
-        </p:nvSpPr>
-        <p:spPr>
-          <a:xfrm>
-            <a:off x="457200" y="152400"/>
-            <a:ext cx="8229600" cy="1143000"/>
-          </a:xfrm>
-        </p:spPr>
-        <p:txBody>
-          <a:bodyPr/>
-          <a:lstStyle/>
-          <a:p>
-            <a:r>
-              <a:rPr lang="en-US" dirty="0" smtClean="0"/>
-              <a:t>Example DM dataset</a:t>
-            </a:r>
-            <a:endParaRPr lang="en-US" dirty="0"/>
-          </a:p>
-        </p:txBody>
-      </p:sp>
-      <p:sp>
-        <p:nvSpPr>
-          <p:cNvPr id="3" name="Content Placeholder 2"/>
-          <p:cNvSpPr>
-            <a:spLocks noGrp="1"/>
-          </p:cNvSpPr>
-          <p:nvPr>
-            <p:ph idx="1"/>
-          </p:nvPr>
-        </p:nvSpPr>
-        <p:spPr/>
-        <p:txBody>
-          <a:bodyPr/>
-          <a:lstStyle/>
-          <a:p>
-            <a:endParaRPr lang="en-US"/>
-          </a:p>
-        </p:txBody>
-      </p:sp>
-      <p:pic>
-        <p:nvPicPr>
-          <p:cNvPr id="1026" name="Picture 2" descr="H:\GitHub\srosanba\sas-sdtm-simulator\img\dm.png"/>
-          <p:cNvPicPr>
-            <a:picLocks noChangeAspect="1" noChangeArrowheads="1"/>
-          </p:cNvPicPr>
-          <p:nvPr/>
-        </p:nvPicPr>
-        <p:blipFill>
-          <a:blip r:embed="rId2">
-            <a:extLst>
-              <a:ext uri="{28A0092B-C50C-407E-A947-70E740481C1C}">
-                <a14:useLocalDpi xmlns:a14="http://schemas.microsoft.com/office/drawing/2010/main" val="0"/>
-              </a:ext>
-            </a:extLst>
-          </a:blip>
-          <a:srcRect/>
-          <a:stretch>
-            <a:fillRect/>
-          </a:stretch>
-        </p:blipFill>
-        <p:spPr bwMode="auto">
-          <a:xfrm>
-            <a:off x="152400" y="1352886"/>
-            <a:ext cx="8899803" cy="5360699"/>
-          </a:xfrm>
-          <a:prstGeom prst="rect">
-            <a:avLst/>
-          </a:prstGeom>
-          <a:noFill/>
-          <a:extLst>
-            <a:ext uri="{909E8E84-426E-40DD-AFC4-6F175D3DCCD1}">
-              <a14:hiddenFill xmlns:a14="http://schemas.microsoft.com/office/drawing/2010/main">
-                <a:solidFill>
-                  <a:srgbClr val="FFFFFF"/>
-                </a:solidFill>
-              </a14:hiddenFill>
-            </a:ext>
-          </a:extLst>
-        </p:spPr>
-      </p:pic>
-      <p:sp>
-        <p:nvSpPr>
-          <p:cNvPr id="10" name="Rectangle 9"/>
-          <p:cNvSpPr/>
-          <p:nvPr/>
-        </p:nvSpPr>
-        <p:spPr>
-          <a:xfrm>
-            <a:off x="7216461" y="1352550"/>
-            <a:ext cx="1309609" cy="5360699"/>
-          </a:xfrm>
-          <a:prstGeom prst="rect">
-            <a:avLst/>
-          </a:prstGeom>
-          <a:noFill/>
-          <a:ln>
-            <a:solidFill>
-              <a:srgbClr val="00B0F0"/>
             </a:solidFill>
           </a:ln>
         </p:spPr>

</xml_diff>